<commit_message>
Synch before heading to office
</commit_message>
<xml_diff>
--- a/CISC874/Project/Presentation/0bc15Presentation.pptx
+++ b/CISC874/Project/Presentation/0bc15Presentation.pptx
@@ -8,11 +8,15 @@
     <p:sldId id="256" r:id="rId2"/>
     <p:sldId id="258" r:id="rId3"/>
     <p:sldId id="257" r:id="rId4"/>
-    <p:sldId id="259" r:id="rId5"/>
-    <p:sldId id="260" r:id="rId6"/>
-    <p:sldId id="261" r:id="rId7"/>
-    <p:sldId id="262" r:id="rId8"/>
-    <p:sldId id="263" r:id="rId9"/>
+    <p:sldId id="264" r:id="rId5"/>
+    <p:sldId id="265" r:id="rId6"/>
+    <p:sldId id="266" r:id="rId7"/>
+    <p:sldId id="260" r:id="rId8"/>
+    <p:sldId id="268" r:id="rId9"/>
+    <p:sldId id="269" r:id="rId10"/>
+    <p:sldId id="261" r:id="rId11"/>
+    <p:sldId id="262" r:id="rId12"/>
+    <p:sldId id="263" r:id="rId13"/>
   </p:sldIdLst>
   <p:sldSz cx="12192000" cy="6858000"/>
   <p:notesSz cx="6858000" cy="9144000"/>
@@ -111,6 +115,11 @@
       </a:defRPr>
     </a:lvl9pPr>
   </p:defaultTextStyle>
+  <p:extLst>
+    <p:ext uri="{EFAFB233-063F-42B5-8137-9DF3F51BA10A}">
+      <p15:sldGuideLst xmlns:p15="http://schemas.microsoft.com/office/powerpoint/2012/main"/>
+    </p:ext>
+  </p:extLst>
 </p:presentation>
 </file>
 
@@ -388,7 +397,7 @@
           <a:p>
             <a:fld id="{8C1E5588-8BC4-4B22-ADAE-E90DB866E4BB}" type="datetimeFigureOut">
               <a:rPr lang="en-CA" smtClean="0"/>
-              <a:t>18/11/2016</a:t>
+              <a:t>30/11/2016</a:t>
             </a:fld>
             <a:endParaRPr lang="en-CA"/>
           </a:p>
@@ -802,7 +811,7 @@
           <a:p>
             <a:fld id="{8C1E5588-8BC4-4B22-ADAE-E90DB866E4BB}" type="datetimeFigureOut">
               <a:rPr lang="en-CA" smtClean="0"/>
-              <a:t>18/11/2016</a:t>
+              <a:t>30/11/2016</a:t>
             </a:fld>
             <a:endParaRPr lang="en-CA"/>
           </a:p>
@@ -1138,7 +1147,7 @@
           <a:p>
             <a:fld id="{8C1E5588-8BC4-4B22-ADAE-E90DB866E4BB}" type="datetimeFigureOut">
               <a:rPr lang="en-CA" smtClean="0"/>
-              <a:t>18/11/2016</a:t>
+              <a:t>30/11/2016</a:t>
             </a:fld>
             <a:endParaRPr lang="en-CA"/>
           </a:p>
@@ -1543,7 +1552,7 @@
           <a:p>
             <a:fld id="{8C1E5588-8BC4-4B22-ADAE-E90DB866E4BB}" type="datetimeFigureOut">
               <a:rPr lang="en-CA" smtClean="0"/>
-              <a:t>18/11/2016</a:t>
+              <a:t>30/11/2016</a:t>
             </a:fld>
             <a:endParaRPr lang="en-CA"/>
           </a:p>
@@ -2111,7 +2120,7 @@
           <a:p>
             <a:fld id="{8C1E5588-8BC4-4B22-ADAE-E90DB866E4BB}" type="datetimeFigureOut">
               <a:rPr lang="en-CA" smtClean="0"/>
-              <a:t>18/11/2016</a:t>
+              <a:t>30/11/2016</a:t>
             </a:fld>
             <a:endParaRPr lang="en-CA"/>
           </a:p>
@@ -2792,7 +2801,7 @@
           <a:p>
             <a:fld id="{8C1E5588-8BC4-4B22-ADAE-E90DB866E4BB}" type="datetimeFigureOut">
               <a:rPr lang="en-CA" smtClean="0"/>
-              <a:t>18/11/2016</a:t>
+              <a:t>30/11/2016</a:t>
             </a:fld>
             <a:endParaRPr lang="en-CA"/>
           </a:p>
@@ -3705,7 +3714,7 @@
           <a:p>
             <a:fld id="{8C1E5588-8BC4-4B22-ADAE-E90DB866E4BB}" type="datetimeFigureOut">
               <a:rPr lang="en-CA" smtClean="0"/>
-              <a:t>18/11/2016</a:t>
+              <a:t>30/11/2016</a:t>
             </a:fld>
             <a:endParaRPr lang="en-CA"/>
           </a:p>
@@ -4018,7 +4027,7 @@
           <a:p>
             <a:fld id="{8C1E5588-8BC4-4B22-ADAE-E90DB866E4BB}" type="datetimeFigureOut">
               <a:rPr lang="en-CA" smtClean="0"/>
-              <a:t>18/11/2016</a:t>
+              <a:t>30/11/2016</a:t>
             </a:fld>
             <a:endParaRPr lang="en-CA"/>
           </a:p>
@@ -4282,7 +4291,7 @@
           <a:p>
             <a:fld id="{8C1E5588-8BC4-4B22-ADAE-E90DB866E4BB}" type="datetimeFigureOut">
               <a:rPr lang="en-CA" smtClean="0"/>
-              <a:t>18/11/2016</a:t>
+              <a:t>30/11/2016</a:t>
             </a:fld>
             <a:endParaRPr lang="en-CA"/>
           </a:p>
@@ -4623,7 +4632,7 @@
           <a:p>
             <a:fld id="{8C1E5588-8BC4-4B22-ADAE-E90DB866E4BB}" type="datetimeFigureOut">
               <a:rPr lang="en-CA" smtClean="0"/>
-              <a:t>18/11/2016</a:t>
+              <a:t>30/11/2016</a:t>
             </a:fld>
             <a:endParaRPr lang="en-CA"/>
           </a:p>
@@ -5012,7 +5021,7 @@
           <a:p>
             <a:fld id="{8C1E5588-8BC4-4B22-ADAE-E90DB866E4BB}" type="datetimeFigureOut">
               <a:rPr lang="en-CA" smtClean="0"/>
-              <a:t>18/11/2016</a:t>
+              <a:t>30/11/2016</a:t>
             </a:fld>
             <a:endParaRPr lang="en-CA"/>
           </a:p>
@@ -5388,7 +5397,7 @@
           <a:p>
             <a:fld id="{8C1E5588-8BC4-4B22-ADAE-E90DB866E4BB}" type="datetimeFigureOut">
               <a:rPr lang="en-CA" smtClean="0"/>
-              <a:t>18/11/2016</a:t>
+              <a:t>30/11/2016</a:t>
             </a:fld>
             <a:endParaRPr lang="en-CA"/>
           </a:p>
@@ -5894,7 +5903,7 @@
           <a:p>
             <a:fld id="{8C1E5588-8BC4-4B22-ADAE-E90DB866E4BB}" type="datetimeFigureOut">
               <a:rPr lang="en-CA" smtClean="0"/>
-              <a:t>18/11/2016</a:t>
+              <a:t>30/11/2016</a:t>
             </a:fld>
             <a:endParaRPr lang="en-CA"/>
           </a:p>
@@ -6151,7 +6160,7 @@
           <a:p>
             <a:fld id="{8C1E5588-8BC4-4B22-ADAE-E90DB866E4BB}" type="datetimeFigureOut">
               <a:rPr lang="en-CA" smtClean="0"/>
-              <a:t>18/11/2016</a:t>
+              <a:t>30/11/2016</a:t>
             </a:fld>
             <a:endParaRPr lang="en-CA"/>
           </a:p>
@@ -6314,7 +6323,7 @@
           <a:p>
             <a:fld id="{8C1E5588-8BC4-4B22-ADAE-E90DB866E4BB}" type="datetimeFigureOut">
               <a:rPr lang="en-CA" smtClean="0"/>
-              <a:t>18/11/2016</a:t>
+              <a:t>30/11/2016</a:t>
             </a:fld>
             <a:endParaRPr lang="en-CA"/>
           </a:p>
@@ -6704,7 +6713,7 @@
           <a:p>
             <a:fld id="{8C1E5588-8BC4-4B22-ADAE-E90DB866E4BB}" type="datetimeFigureOut">
               <a:rPr lang="en-CA" smtClean="0"/>
-              <a:t>18/11/2016</a:t>
+              <a:t>30/11/2016</a:t>
             </a:fld>
             <a:endParaRPr lang="en-CA"/>
           </a:p>
@@ -7113,7 +7122,7 @@
           <a:p>
             <a:fld id="{8C1E5588-8BC4-4B22-ADAE-E90DB866E4BB}" type="datetimeFigureOut">
               <a:rPr lang="en-CA" smtClean="0"/>
-              <a:t>18/11/2016</a:t>
+              <a:t>30/11/2016</a:t>
             </a:fld>
             <a:endParaRPr lang="en-CA"/>
           </a:p>
@@ -7357,7 +7366,7 @@
           <a:p>
             <a:fld id="{8C1E5588-8BC4-4B22-ADAE-E90DB866E4BB}" type="datetimeFigureOut">
               <a:rPr lang="en-CA" smtClean="0"/>
-              <a:t>18/11/2016</a:t>
+              <a:t>30/11/2016</a:t>
             </a:fld>
             <a:endParaRPr lang="en-CA"/>
           </a:p>
@@ -7882,6 +7891,259 @@
   <p:clrMapOvr>
     <a:masterClrMapping/>
   </p:clrMapOvr>
+  <p:timing>
+    <p:tnLst>
+      <p:par>
+        <p:cTn id="1" dur="indefinite" restart="never" nodeType="tmRoot"/>
+      </p:par>
+    </p:tnLst>
+  </p:timing>
+</p:sld>
+</file>
+
+<file path=ppt/slides/slide10.xml><?xml version="1.0" encoding="utf-8"?>
+<p:sld xmlns:a="http://schemas.openxmlformats.org/drawingml/2006/main" xmlns:r="http://schemas.openxmlformats.org/officeDocument/2006/relationships" xmlns:p="http://schemas.openxmlformats.org/presentationml/2006/main">
+  <p:cSld>
+    <p:spTree>
+      <p:nvGrpSpPr>
+        <p:cNvPr id="1" name=""/>
+        <p:cNvGrpSpPr/>
+        <p:nvPr/>
+      </p:nvGrpSpPr>
+      <p:grpSpPr>
+        <a:xfrm>
+          <a:off x="0" y="0"/>
+          <a:ext cx="0" cy="0"/>
+          <a:chOff x="0" y="0"/>
+          <a:chExt cx="0" cy="0"/>
+        </a:xfrm>
+      </p:grpSpPr>
+      <p:sp>
+        <p:nvSpPr>
+          <p:cNvPr id="2" name="Title 1"/>
+          <p:cNvSpPr>
+            <a:spLocks noGrp="1"/>
+          </p:cNvSpPr>
+          <p:nvPr>
+            <p:ph type="title"/>
+          </p:nvPr>
+        </p:nvSpPr>
+        <p:spPr/>
+        <p:txBody>
+          <a:bodyPr>
+            <a:normAutofit/>
+          </a:bodyPr>
+          <a:lstStyle/>
+          <a:p>
+            <a:r>
+              <a:rPr lang="en-CA" sz="4800" dirty="0" smtClean="0"/>
+              <a:t>Methods – Neural network</a:t>
+            </a:r>
+            <a:endParaRPr lang="en-CA" sz="4800" dirty="0"/>
+          </a:p>
+        </p:txBody>
+      </p:sp>
+      <p:sp>
+        <p:nvSpPr>
+          <p:cNvPr id="3" name="Content Placeholder 2"/>
+          <p:cNvSpPr>
+            <a:spLocks noGrp="1"/>
+          </p:cNvSpPr>
+          <p:nvPr>
+            <p:ph idx="1"/>
+          </p:nvPr>
+        </p:nvSpPr>
+        <p:spPr/>
+        <p:txBody>
+          <a:bodyPr/>
+          <a:lstStyle/>
+          <a:p>
+            <a:endParaRPr lang="en-CA" dirty="0">
+              <a:solidFill>
+                <a:schemeClr val="bg1">
+                  <a:lumMod val="95000"/>
+                  <a:lumOff val="5000"/>
+                </a:schemeClr>
+              </a:solidFill>
+            </a:endParaRPr>
+          </a:p>
+        </p:txBody>
+      </p:sp>
+    </p:spTree>
+    <p:extLst>
+      <p:ext uri="{BB962C8B-B14F-4D97-AF65-F5344CB8AC3E}">
+        <p14:creationId xmlns:p14="http://schemas.microsoft.com/office/powerpoint/2010/main" val="28893490"/>
+      </p:ext>
+    </p:extLst>
+  </p:cSld>
+  <p:clrMapOvr>
+    <a:masterClrMapping/>
+  </p:clrMapOvr>
+  <p:timing>
+    <p:tnLst>
+      <p:par>
+        <p:cTn id="1" dur="indefinite" restart="never" nodeType="tmRoot"/>
+      </p:par>
+    </p:tnLst>
+  </p:timing>
+</p:sld>
+</file>
+
+<file path=ppt/slides/slide11.xml><?xml version="1.0" encoding="utf-8"?>
+<p:sld xmlns:a="http://schemas.openxmlformats.org/drawingml/2006/main" xmlns:r="http://schemas.openxmlformats.org/officeDocument/2006/relationships" xmlns:p="http://schemas.openxmlformats.org/presentationml/2006/main">
+  <p:cSld>
+    <p:spTree>
+      <p:nvGrpSpPr>
+        <p:cNvPr id="1" name=""/>
+        <p:cNvGrpSpPr/>
+        <p:nvPr/>
+      </p:nvGrpSpPr>
+      <p:grpSpPr>
+        <a:xfrm>
+          <a:off x="0" y="0"/>
+          <a:ext cx="0" cy="0"/>
+          <a:chOff x="0" y="0"/>
+          <a:chExt cx="0" cy="0"/>
+        </a:xfrm>
+      </p:grpSpPr>
+      <p:sp>
+        <p:nvSpPr>
+          <p:cNvPr id="2" name="Title 1"/>
+          <p:cNvSpPr>
+            <a:spLocks noGrp="1"/>
+          </p:cNvSpPr>
+          <p:nvPr>
+            <p:ph type="title"/>
+          </p:nvPr>
+        </p:nvSpPr>
+        <p:spPr/>
+        <p:txBody>
+          <a:bodyPr/>
+          <a:lstStyle/>
+          <a:p>
+            <a:r>
+              <a:rPr lang="en-CA" sz="4800" dirty="0" smtClean="0"/>
+              <a:t>Results</a:t>
+            </a:r>
+            <a:endParaRPr lang="en-CA" dirty="0"/>
+          </a:p>
+        </p:txBody>
+      </p:sp>
+      <p:sp>
+        <p:nvSpPr>
+          <p:cNvPr id="3" name="Content Placeholder 2"/>
+          <p:cNvSpPr>
+            <a:spLocks noGrp="1"/>
+          </p:cNvSpPr>
+          <p:nvPr>
+            <p:ph idx="1"/>
+          </p:nvPr>
+        </p:nvSpPr>
+        <p:spPr/>
+        <p:txBody>
+          <a:bodyPr/>
+          <a:lstStyle/>
+          <a:p>
+            <a:endParaRPr lang="en-CA" dirty="0">
+              <a:solidFill>
+                <a:schemeClr val="bg1">
+                  <a:lumMod val="95000"/>
+                  <a:lumOff val="5000"/>
+                </a:schemeClr>
+              </a:solidFill>
+            </a:endParaRPr>
+          </a:p>
+        </p:txBody>
+      </p:sp>
+    </p:spTree>
+    <p:extLst>
+      <p:ext uri="{BB962C8B-B14F-4D97-AF65-F5344CB8AC3E}">
+        <p14:creationId xmlns:p14="http://schemas.microsoft.com/office/powerpoint/2010/main" val="1617845456"/>
+      </p:ext>
+    </p:extLst>
+  </p:cSld>
+  <p:clrMapOvr>
+    <a:masterClrMapping/>
+  </p:clrMapOvr>
+</p:sld>
+</file>
+
+<file path=ppt/slides/slide12.xml><?xml version="1.0" encoding="utf-8"?>
+<p:sld xmlns:a="http://schemas.openxmlformats.org/drawingml/2006/main" xmlns:r="http://schemas.openxmlformats.org/officeDocument/2006/relationships" xmlns:p="http://schemas.openxmlformats.org/presentationml/2006/main">
+  <p:cSld>
+    <p:spTree>
+      <p:nvGrpSpPr>
+        <p:cNvPr id="1" name=""/>
+        <p:cNvGrpSpPr/>
+        <p:nvPr/>
+      </p:nvGrpSpPr>
+      <p:grpSpPr>
+        <a:xfrm>
+          <a:off x="0" y="0"/>
+          <a:ext cx="0" cy="0"/>
+          <a:chOff x="0" y="0"/>
+          <a:chExt cx="0" cy="0"/>
+        </a:xfrm>
+      </p:grpSpPr>
+      <p:sp>
+        <p:nvSpPr>
+          <p:cNvPr id="2" name="Title 1"/>
+          <p:cNvSpPr>
+            <a:spLocks noGrp="1"/>
+          </p:cNvSpPr>
+          <p:nvPr>
+            <p:ph type="title"/>
+          </p:nvPr>
+        </p:nvSpPr>
+        <p:spPr/>
+        <p:txBody>
+          <a:bodyPr/>
+          <a:lstStyle/>
+          <a:p>
+            <a:r>
+              <a:rPr lang="en-CA" sz="4800" dirty="0" smtClean="0"/>
+              <a:t>Discussion</a:t>
+            </a:r>
+            <a:endParaRPr lang="en-CA" dirty="0"/>
+          </a:p>
+        </p:txBody>
+      </p:sp>
+      <p:sp>
+        <p:nvSpPr>
+          <p:cNvPr id="3" name="Content Placeholder 2"/>
+          <p:cNvSpPr>
+            <a:spLocks noGrp="1"/>
+          </p:cNvSpPr>
+          <p:nvPr>
+            <p:ph idx="1"/>
+          </p:nvPr>
+        </p:nvSpPr>
+        <p:spPr/>
+        <p:txBody>
+          <a:bodyPr/>
+          <a:lstStyle/>
+          <a:p>
+            <a:endParaRPr lang="en-CA" dirty="0">
+              <a:solidFill>
+                <a:schemeClr val="bg1">
+                  <a:lumMod val="95000"/>
+                  <a:lumOff val="5000"/>
+                </a:schemeClr>
+              </a:solidFill>
+            </a:endParaRPr>
+          </a:p>
+        </p:txBody>
+      </p:sp>
+    </p:spTree>
+    <p:extLst>
+      <p:ext uri="{BB962C8B-B14F-4D97-AF65-F5344CB8AC3E}">
+        <p14:creationId xmlns:p14="http://schemas.microsoft.com/office/powerpoint/2010/main" val="3360305982"/>
+      </p:ext>
+    </p:extLst>
+  </p:cSld>
+  <p:clrMapOvr>
+    <a:masterClrMapping/>
+  </p:clrMapOvr>
 </p:sld>
 </file>
 
@@ -7914,14 +8176,16 @@
         </p:nvSpPr>
         <p:spPr/>
         <p:txBody>
-          <a:bodyPr/>
+          <a:bodyPr>
+            <a:normAutofit/>
+          </a:bodyPr>
           <a:lstStyle/>
           <a:p>
             <a:r>
-              <a:rPr lang="en-CA" dirty="0" smtClean="0"/>
+              <a:rPr lang="en-CA" sz="4800" dirty="0" smtClean="0"/>
               <a:t>Content</a:t>
             </a:r>
-            <a:endParaRPr lang="en-CA" dirty="0"/>
+            <a:endParaRPr lang="en-CA" sz="4800" dirty="0"/>
           </a:p>
         </p:txBody>
       </p:sp>
@@ -7937,7 +8201,9 @@
         </p:nvSpPr>
         <p:spPr/>
         <p:txBody>
-          <a:bodyPr/>
+          <a:bodyPr>
+            <a:normAutofit lnSpcReduction="10000"/>
+          </a:bodyPr>
           <a:lstStyle/>
           <a:p>
             <a:r>
@@ -7968,8 +8234,42 @@
                   <a:srgbClr val="000000"/>
                 </a:solidFill>
               </a:rPr>
-              <a:t>Scoliosis quantification</a:t>
-            </a:r>
+              <a:t>Assessment</a:t>
+            </a:r>
+          </a:p>
+          <a:p>
+            <a:pPr lvl="1"/>
+            <a:r>
+              <a:rPr lang="en-CA" dirty="0" smtClean="0">
+                <a:solidFill>
+                  <a:srgbClr val="000000"/>
+                </a:solidFill>
+              </a:rPr>
+              <a:t>Tracked </a:t>
+            </a:r>
+            <a:r>
+              <a:rPr lang="en-CA" dirty="0" smtClean="0">
+                <a:solidFill>
+                  <a:srgbClr val="000000"/>
+                </a:solidFill>
+              </a:rPr>
+              <a:t>ultrasound</a:t>
+            </a:r>
+          </a:p>
+          <a:p>
+            <a:r>
+              <a:rPr lang="en-CA" dirty="0" smtClean="0">
+                <a:solidFill>
+                  <a:srgbClr val="000000"/>
+                </a:solidFill>
+              </a:rPr>
+              <a:t>Motivation</a:t>
+            </a:r>
+            <a:endParaRPr lang="en-CA" dirty="0" smtClean="0">
+              <a:solidFill>
+                <a:srgbClr val="000000"/>
+              </a:solidFill>
+            </a:endParaRPr>
           </a:p>
           <a:p>
             <a:r>
@@ -8035,6 +8335,13 @@
   <p:clrMapOvr>
     <a:masterClrMapping/>
   </p:clrMapOvr>
+  <p:timing>
+    <p:tnLst>
+      <p:par>
+        <p:cTn id="1" dur="indefinite" restart="never" nodeType="tmRoot"/>
+      </p:par>
+    </p:tnLst>
+  </p:timing>
 </p:sld>
 </file>
 
@@ -8067,14 +8374,16 @@
         </p:nvSpPr>
         <p:spPr/>
         <p:txBody>
-          <a:bodyPr/>
+          <a:bodyPr>
+            <a:normAutofit/>
+          </a:bodyPr>
           <a:lstStyle/>
           <a:p>
             <a:r>
-              <a:rPr lang="en-CA" dirty="0" smtClean="0"/>
+              <a:rPr lang="en-CA" sz="4800" dirty="0" smtClean="0"/>
               <a:t>Background - Scoliosis</a:t>
             </a:r>
-            <a:endParaRPr lang="en-CA" dirty="0"/>
+            <a:endParaRPr lang="en-CA" sz="4800" dirty="0"/>
           </a:p>
         </p:txBody>
       </p:sp>
@@ -8088,12 +8397,56 @@
             <p:ph idx="1"/>
           </p:nvPr>
         </p:nvSpPr>
-        <p:spPr/>
-        <p:txBody>
-          <a:bodyPr/>
+        <p:spPr>
+          <a:xfrm>
+            <a:off x="680321" y="2336873"/>
+            <a:ext cx="4832205" cy="3599316"/>
+          </a:xfrm>
+        </p:spPr>
+        <p:txBody>
+          <a:bodyPr>
+            <a:normAutofit/>
+          </a:bodyPr>
           <a:lstStyle/>
           <a:p>
-            <a:endParaRPr lang="en-CA" dirty="0">
+            <a:r>
+              <a:rPr lang="en-CA" sz="2800" dirty="0" smtClean="0">
+                <a:solidFill>
+                  <a:schemeClr val="bg1">
+                    <a:lumMod val="95000"/>
+                    <a:lumOff val="5000"/>
+                  </a:schemeClr>
+                </a:solidFill>
+              </a:rPr>
+              <a:t>Pathological spinal curvature</a:t>
+            </a:r>
+          </a:p>
+          <a:p>
+            <a:r>
+              <a:rPr lang="en-CA" sz="2800" dirty="0" smtClean="0">
+                <a:solidFill>
+                  <a:schemeClr val="bg1">
+                    <a:lumMod val="95000"/>
+                    <a:lumOff val="5000"/>
+                  </a:schemeClr>
+                </a:solidFill>
+              </a:rPr>
+              <a:t>Develops during growth</a:t>
+            </a:r>
+          </a:p>
+          <a:p>
+            <a:r>
+              <a:rPr lang="en-CA" sz="2800" dirty="0" smtClean="0">
+                <a:solidFill>
+                  <a:schemeClr val="bg1">
+                    <a:lumMod val="95000"/>
+                    <a:lumOff val="5000"/>
+                  </a:schemeClr>
+                </a:solidFill>
+              </a:rPr>
+              <a:t>Must be monitored</a:t>
+            </a:r>
+            <a:endParaRPr lang="en-CA" sz="2800" dirty="0">
               <a:solidFill>
                 <a:schemeClr val="bg1">
                   <a:lumMod val="95000"/>
@@ -8104,6 +8457,65 @@
           </a:p>
         </p:txBody>
       </p:sp>
+      <p:pic>
+        <p:nvPicPr>
+          <p:cNvPr id="4" name="Picture 3"/>
+          <p:cNvPicPr>
+            <a:picLocks noChangeAspect="1"/>
+          </p:cNvPicPr>
+          <p:nvPr/>
+        </p:nvPicPr>
+        <p:blipFill rotWithShape="1">
+          <a:blip r:embed="rId2">
+            <a:extLst>
+              <a:ext uri="{28A0092B-C50C-407E-A947-70E740481C1C}">
+                <a14:useLocalDpi xmlns:a14="http://schemas.microsoft.com/office/drawing/2010/main" val="0"/>
+              </a:ext>
+            </a:extLst>
+          </a:blip>
+          <a:srcRect l="26319" t="1143" r="26779" b="2095"/>
+          <a:stretch/>
+        </p:blipFill>
+        <p:spPr>
+          <a:xfrm>
+            <a:off x="7376159" y="1692789"/>
+            <a:ext cx="2525487" cy="4716720"/>
+          </a:xfrm>
+          <a:prstGeom prst="rect">
+            <a:avLst/>
+          </a:prstGeom>
+          <a:solidFill>
+            <a:srgbClr val="FFFFFF">
+              <a:shade val="85000"/>
+            </a:srgbClr>
+          </a:solidFill>
+          <a:ln w="76200" cap="sq">
+            <a:solidFill>
+              <a:schemeClr val="tx1"/>
+            </a:solidFill>
+            <a:miter lim="800000"/>
+          </a:ln>
+          <a:effectLst>
+            <a:outerShdw blurRad="55000" dist="18000" dir="5400000" algn="tl" rotWithShape="0">
+              <a:srgbClr val="000000">
+                <a:alpha val="40000"/>
+              </a:srgbClr>
+            </a:outerShdw>
+          </a:effectLst>
+          <a:scene3d>
+            <a:camera prst="orthographicFront"/>
+            <a:lightRig rig="twoPt" dir="t">
+              <a:rot lat="0" lon="0" rev="7200000"/>
+            </a:lightRig>
+          </a:scene3d>
+          <a:sp3d>
+            <a:bevelT w="25400" h="19050"/>
+            <a:contourClr>
+              <a:srgbClr val="FFFFFF"/>
+            </a:contourClr>
+          </a:sp3d>
+        </p:spPr>
+      </p:pic>
     </p:spTree>
     <p:extLst>
       <p:ext uri="{BB962C8B-B14F-4D97-AF65-F5344CB8AC3E}">
@@ -8114,6 +8526,272 @@
   <p:clrMapOvr>
     <a:masterClrMapping/>
   </p:clrMapOvr>
+  <p:timing>
+    <p:tnLst>
+      <p:par>
+        <p:cTn id="1" dur="indefinite" restart="never" nodeType="tmRoot">
+          <p:childTnLst>
+            <p:seq concurrent="1" nextAc="seek">
+              <p:cTn id="2" dur="indefinite" nodeType="mainSeq">
+                <p:childTnLst>
+                  <p:par>
+                    <p:cTn id="3" fill="hold">
+                      <p:stCondLst>
+                        <p:cond delay="indefinite"/>
+                      </p:stCondLst>
+                      <p:childTnLst>
+                        <p:par>
+                          <p:cTn id="4" fill="hold">
+                            <p:stCondLst>
+                              <p:cond delay="0"/>
+                            </p:stCondLst>
+                            <p:childTnLst>
+                              <p:par>
+                                <p:cTn id="5" presetID="10" presetClass="entr" presetSubtype="0" fill="hold" nodeType="clickEffect">
+                                  <p:stCondLst>
+                                    <p:cond delay="0"/>
+                                  </p:stCondLst>
+                                  <p:childTnLst>
+                                    <p:set>
+                                      <p:cBhvr>
+                                        <p:cTn id="6" dur="1" fill="hold">
+                                          <p:stCondLst>
+                                            <p:cond delay="0"/>
+                                          </p:stCondLst>
+                                        </p:cTn>
+                                        <p:tgtEl>
+                                          <p:spTgt spid="3">
+                                            <p:txEl>
+                                              <p:pRg st="0" end="0"/>
+                                            </p:txEl>
+                                          </p:spTgt>
+                                        </p:tgtEl>
+                                        <p:attrNameLst>
+                                          <p:attrName>style.visibility</p:attrName>
+                                        </p:attrNameLst>
+                                      </p:cBhvr>
+                                      <p:to>
+                                        <p:strVal val="visible"/>
+                                      </p:to>
+                                    </p:set>
+                                    <p:animEffect transition="in" filter="fade">
+                                      <p:cBhvr>
+                                        <p:cTn id="7" dur="1000"/>
+                                        <p:tgtEl>
+                                          <p:spTgt spid="3">
+                                            <p:txEl>
+                                              <p:pRg st="0" end="0"/>
+                                            </p:txEl>
+                                          </p:spTgt>
+                                        </p:tgtEl>
+                                      </p:cBhvr>
+                                    </p:animEffect>
+                                  </p:childTnLst>
+                                </p:cTn>
+                              </p:par>
+                            </p:childTnLst>
+                          </p:cTn>
+                        </p:par>
+                      </p:childTnLst>
+                    </p:cTn>
+                  </p:par>
+                  <p:par>
+                    <p:cTn id="8" fill="hold">
+                      <p:stCondLst>
+                        <p:cond delay="indefinite"/>
+                      </p:stCondLst>
+                      <p:childTnLst>
+                        <p:par>
+                          <p:cTn id="9" fill="hold">
+                            <p:stCondLst>
+                              <p:cond delay="0"/>
+                            </p:stCondLst>
+                            <p:childTnLst>
+                              <p:par>
+                                <p:cTn id="10" presetID="10" presetClass="entr" presetSubtype="0" fill="hold" nodeType="clickEffect">
+                                  <p:stCondLst>
+                                    <p:cond delay="0"/>
+                                  </p:stCondLst>
+                                  <p:childTnLst>
+                                    <p:set>
+                                      <p:cBhvr>
+                                        <p:cTn id="11" dur="1" fill="hold">
+                                          <p:stCondLst>
+                                            <p:cond delay="0"/>
+                                          </p:stCondLst>
+                                        </p:cTn>
+                                        <p:tgtEl>
+                                          <p:spTgt spid="4"/>
+                                        </p:tgtEl>
+                                        <p:attrNameLst>
+                                          <p:attrName>style.visibility</p:attrName>
+                                        </p:attrNameLst>
+                                      </p:cBhvr>
+                                      <p:to>
+                                        <p:strVal val="visible"/>
+                                      </p:to>
+                                    </p:set>
+                                    <p:animEffect transition="in" filter="fade">
+                                      <p:cBhvr>
+                                        <p:cTn id="12" dur="1000"/>
+                                        <p:tgtEl>
+                                          <p:spTgt spid="4"/>
+                                        </p:tgtEl>
+                                      </p:cBhvr>
+                                    </p:animEffect>
+                                  </p:childTnLst>
+                                </p:cTn>
+                              </p:par>
+                            </p:childTnLst>
+                          </p:cTn>
+                        </p:par>
+                      </p:childTnLst>
+                    </p:cTn>
+                  </p:par>
+                  <p:par>
+                    <p:cTn id="13" fill="hold">
+                      <p:stCondLst>
+                        <p:cond delay="indefinite"/>
+                      </p:stCondLst>
+                      <p:childTnLst>
+                        <p:par>
+                          <p:cTn id="14" fill="hold">
+                            <p:stCondLst>
+                              <p:cond delay="0"/>
+                            </p:stCondLst>
+                            <p:childTnLst>
+                              <p:par>
+                                <p:cTn id="15" presetID="10" presetClass="entr" presetSubtype="0" fill="hold" nodeType="clickEffect">
+                                  <p:stCondLst>
+                                    <p:cond delay="0"/>
+                                  </p:stCondLst>
+                                  <p:childTnLst>
+                                    <p:set>
+                                      <p:cBhvr>
+                                        <p:cTn id="16" dur="1" fill="hold">
+                                          <p:stCondLst>
+                                            <p:cond delay="0"/>
+                                          </p:stCondLst>
+                                        </p:cTn>
+                                        <p:tgtEl>
+                                          <p:spTgt spid="3">
+                                            <p:txEl>
+                                              <p:pRg st="1" end="1"/>
+                                            </p:txEl>
+                                          </p:spTgt>
+                                        </p:tgtEl>
+                                        <p:attrNameLst>
+                                          <p:attrName>style.visibility</p:attrName>
+                                        </p:attrNameLst>
+                                      </p:cBhvr>
+                                      <p:to>
+                                        <p:strVal val="visible"/>
+                                      </p:to>
+                                    </p:set>
+                                    <p:animEffect transition="in" filter="fade">
+                                      <p:cBhvr>
+                                        <p:cTn id="17" dur="1000"/>
+                                        <p:tgtEl>
+                                          <p:spTgt spid="3">
+                                            <p:txEl>
+                                              <p:pRg st="1" end="1"/>
+                                            </p:txEl>
+                                          </p:spTgt>
+                                        </p:tgtEl>
+                                      </p:cBhvr>
+                                    </p:animEffect>
+                                  </p:childTnLst>
+                                </p:cTn>
+                              </p:par>
+                            </p:childTnLst>
+                          </p:cTn>
+                        </p:par>
+                      </p:childTnLst>
+                    </p:cTn>
+                  </p:par>
+                  <p:par>
+                    <p:cTn id="18" fill="hold">
+                      <p:stCondLst>
+                        <p:cond delay="indefinite"/>
+                      </p:stCondLst>
+                      <p:childTnLst>
+                        <p:par>
+                          <p:cTn id="19" fill="hold">
+                            <p:stCondLst>
+                              <p:cond delay="0"/>
+                            </p:stCondLst>
+                            <p:childTnLst>
+                              <p:par>
+                                <p:cTn id="20" presetID="10" presetClass="entr" presetSubtype="0" fill="hold" nodeType="clickEffect">
+                                  <p:stCondLst>
+                                    <p:cond delay="0"/>
+                                  </p:stCondLst>
+                                  <p:childTnLst>
+                                    <p:set>
+                                      <p:cBhvr>
+                                        <p:cTn id="21" dur="1" fill="hold">
+                                          <p:stCondLst>
+                                            <p:cond delay="0"/>
+                                          </p:stCondLst>
+                                        </p:cTn>
+                                        <p:tgtEl>
+                                          <p:spTgt spid="3">
+                                            <p:txEl>
+                                              <p:pRg st="2" end="2"/>
+                                            </p:txEl>
+                                          </p:spTgt>
+                                        </p:tgtEl>
+                                        <p:attrNameLst>
+                                          <p:attrName>style.visibility</p:attrName>
+                                        </p:attrNameLst>
+                                      </p:cBhvr>
+                                      <p:to>
+                                        <p:strVal val="visible"/>
+                                      </p:to>
+                                    </p:set>
+                                    <p:animEffect transition="in" filter="fade">
+                                      <p:cBhvr>
+                                        <p:cTn id="22" dur="1000"/>
+                                        <p:tgtEl>
+                                          <p:spTgt spid="3">
+                                            <p:txEl>
+                                              <p:pRg st="2" end="2"/>
+                                            </p:txEl>
+                                          </p:spTgt>
+                                        </p:tgtEl>
+                                      </p:cBhvr>
+                                    </p:animEffect>
+                                  </p:childTnLst>
+                                </p:cTn>
+                              </p:par>
+                            </p:childTnLst>
+                          </p:cTn>
+                        </p:par>
+                      </p:childTnLst>
+                    </p:cTn>
+                  </p:par>
+                </p:childTnLst>
+              </p:cTn>
+              <p:prevCondLst>
+                <p:cond evt="onPrev" delay="0">
+                  <p:tgtEl>
+                    <p:sldTgt/>
+                  </p:tgtEl>
+                </p:cond>
+              </p:prevCondLst>
+              <p:nextCondLst>
+                <p:cond evt="onNext" delay="0">
+                  <p:tgtEl>
+                    <p:sldTgt/>
+                  </p:tgtEl>
+                </p:cond>
+              </p:nextCondLst>
+            </p:seq>
+          </p:childTnLst>
+        </p:cTn>
+      </p:par>
+    </p:tnLst>
+  </p:timing>
 </p:sld>
 </file>
 
@@ -8146,14 +8824,15 @@
         </p:nvSpPr>
         <p:spPr/>
         <p:txBody>
-          <a:bodyPr/>
+          <a:bodyPr>
+            <a:normAutofit/>
+          </a:bodyPr>
           <a:lstStyle/>
           <a:p>
             <a:r>
-              <a:rPr lang="en-CA" dirty="0" smtClean="0"/>
-              <a:t>Background – Scoliosis quantification</a:t>
-            </a:r>
-            <a:endParaRPr lang="en-CA" dirty="0"/>
+              <a:rPr lang="en-CA" sz="4800" dirty="0"/>
+              <a:t>Background – Assessment</a:t>
+            </a:r>
           </a:p>
         </p:txBody>
       </p:sp>
@@ -8167,12 +8846,64 @@
             <p:ph idx="1"/>
           </p:nvPr>
         </p:nvSpPr>
-        <p:spPr/>
-        <p:txBody>
-          <a:bodyPr/>
+        <p:spPr>
+          <a:xfrm>
+            <a:off x="680321" y="2336873"/>
+            <a:ext cx="4832205" cy="3599316"/>
+          </a:xfrm>
+        </p:spPr>
+        <p:txBody>
+          <a:bodyPr>
+            <a:normAutofit/>
+          </a:bodyPr>
           <a:lstStyle/>
           <a:p>
-            <a:endParaRPr lang="en-CA" dirty="0">
+            <a:r>
+              <a:rPr lang="en-CA" sz="2800" dirty="0" smtClean="0">
+                <a:solidFill>
+                  <a:schemeClr val="bg1">
+                    <a:lumMod val="95000"/>
+                    <a:lumOff val="5000"/>
+                  </a:schemeClr>
+                </a:solidFill>
+              </a:rPr>
+              <a:t>X-ray imaging is the </a:t>
+            </a:r>
+            <a:br>
+              <a:rPr lang="en-CA" sz="2800" dirty="0" smtClean="0">
+                <a:solidFill>
+                  <a:schemeClr val="bg1">
+                    <a:lumMod val="95000"/>
+                    <a:lumOff val="5000"/>
+                  </a:schemeClr>
+                </a:solidFill>
+              </a:rPr>
+            </a:br>
+            <a:r>
+              <a:rPr lang="en-CA" sz="2800" dirty="0" smtClean="0">
+                <a:solidFill>
+                  <a:schemeClr val="bg1">
+                    <a:lumMod val="95000"/>
+                    <a:lumOff val="5000"/>
+                  </a:schemeClr>
+                </a:solidFill>
+              </a:rPr>
+              <a:t>gold-standard</a:t>
+            </a:r>
+          </a:p>
+          <a:p>
+            <a:r>
+              <a:rPr lang="en-CA" sz="2800" dirty="0" smtClean="0">
+                <a:solidFill>
+                  <a:schemeClr val="bg1">
+                    <a:lumMod val="95000"/>
+                    <a:lumOff val="5000"/>
+                  </a:schemeClr>
+                </a:solidFill>
+              </a:rPr>
+              <a:t>Measure Cobb angle from X-ray, quantifying severity</a:t>
+            </a:r>
+            <a:endParaRPr lang="en-CA" sz="2800" dirty="0">
               <a:solidFill>
                 <a:schemeClr val="bg1">
                   <a:lumMod val="95000"/>
@@ -8183,16 +8914,581 @@
           </a:p>
         </p:txBody>
       </p:sp>
+      <p:pic>
+        <p:nvPicPr>
+          <p:cNvPr id="4" name="Picture 3"/>
+          <p:cNvPicPr>
+            <a:picLocks noChangeAspect="1"/>
+          </p:cNvPicPr>
+          <p:nvPr/>
+        </p:nvPicPr>
+        <p:blipFill rotWithShape="1">
+          <a:blip r:embed="rId2">
+            <a:extLst>
+              <a:ext uri="{28A0092B-C50C-407E-A947-70E740481C1C}">
+                <a14:useLocalDpi xmlns:a14="http://schemas.microsoft.com/office/drawing/2010/main" val="0"/>
+              </a:ext>
+            </a:extLst>
+          </a:blip>
+          <a:srcRect l="26319" t="1143" r="26779" b="2095"/>
+          <a:stretch/>
+        </p:blipFill>
+        <p:spPr>
+          <a:xfrm>
+            <a:off x="7376159" y="1692789"/>
+            <a:ext cx="2525487" cy="4716720"/>
+          </a:xfrm>
+          <a:prstGeom prst="rect">
+            <a:avLst/>
+          </a:prstGeom>
+          <a:solidFill>
+            <a:srgbClr val="FFFFFF">
+              <a:shade val="85000"/>
+            </a:srgbClr>
+          </a:solidFill>
+          <a:ln w="76200" cap="sq">
+            <a:solidFill>
+              <a:srgbClr val="FFFFFF"/>
+            </a:solidFill>
+            <a:miter lim="800000"/>
+          </a:ln>
+          <a:effectLst>
+            <a:outerShdw blurRad="55000" dist="18000" dir="5400000" algn="tl" rotWithShape="0">
+              <a:srgbClr val="000000">
+                <a:alpha val="40000"/>
+              </a:srgbClr>
+            </a:outerShdw>
+          </a:effectLst>
+          <a:scene3d>
+            <a:camera prst="orthographicFront"/>
+            <a:lightRig rig="twoPt" dir="t">
+              <a:rot lat="0" lon="0" rev="7200000"/>
+            </a:lightRig>
+          </a:scene3d>
+          <a:sp3d>
+            <a:bevelT w="25400" h="19050"/>
+            <a:contourClr>
+              <a:srgbClr val="FFFFFF"/>
+            </a:contourClr>
+          </a:sp3d>
+        </p:spPr>
+      </p:pic>
+      <p:pic>
+        <p:nvPicPr>
+          <p:cNvPr id="6" name="Picture 5"/>
+          <p:cNvPicPr>
+            <a:picLocks noChangeAspect="1"/>
+          </p:cNvPicPr>
+          <p:nvPr/>
+        </p:nvPicPr>
+        <p:blipFill>
+          <a:blip r:embed="rId3">
+            <a:extLst>
+              <a:ext uri="{28A0092B-C50C-407E-A947-70E740481C1C}">
+                <a14:useLocalDpi xmlns:a14="http://schemas.microsoft.com/office/drawing/2010/main" val="0"/>
+              </a:ext>
+            </a:extLst>
+          </a:blip>
+          <a:stretch>
+            <a:fillRect/>
+          </a:stretch>
+        </p:blipFill>
+        <p:spPr>
+          <a:xfrm>
+            <a:off x="7418537" y="1692789"/>
+            <a:ext cx="2440731" cy="4716720"/>
+          </a:xfrm>
+          <a:prstGeom prst="rect">
+            <a:avLst/>
+          </a:prstGeom>
+          <a:solidFill>
+            <a:srgbClr val="FFFFFF">
+              <a:shade val="85000"/>
+            </a:srgbClr>
+          </a:solidFill>
+          <a:ln w="76200" cap="sq">
+            <a:solidFill>
+              <a:srgbClr val="FFFFFF"/>
+            </a:solidFill>
+            <a:miter lim="800000"/>
+          </a:ln>
+          <a:effectLst>
+            <a:outerShdw blurRad="55000" dist="18000" dir="5400000" algn="tl" rotWithShape="0">
+              <a:srgbClr val="000000">
+                <a:alpha val="40000"/>
+              </a:srgbClr>
+            </a:outerShdw>
+          </a:effectLst>
+          <a:scene3d>
+            <a:camera prst="orthographicFront"/>
+            <a:lightRig rig="twoPt" dir="t">
+              <a:rot lat="0" lon="0" rev="7200000"/>
+            </a:lightRig>
+          </a:scene3d>
+          <a:sp3d>
+            <a:bevelT w="25400" h="19050"/>
+            <a:contourClr>
+              <a:srgbClr val="FFFFFF"/>
+            </a:contourClr>
+          </a:sp3d>
+        </p:spPr>
+      </p:pic>
+      <p:cxnSp>
+        <p:nvCxnSpPr>
+          <p:cNvPr id="8" name="Straight Connector 7"/>
+          <p:cNvCxnSpPr/>
+          <p:nvPr/>
+        </p:nvCxnSpPr>
+        <p:spPr>
+          <a:xfrm flipH="1">
+            <a:off x="7878618" y="2613891"/>
+            <a:ext cx="785091" cy="249382"/>
+          </a:xfrm>
+          <a:prstGeom prst="line">
+            <a:avLst/>
+          </a:prstGeom>
+          <a:ln w="38100">
+            <a:solidFill>
+              <a:srgbClr val="FFFF00"/>
+            </a:solidFill>
+          </a:ln>
+        </p:spPr>
+        <p:style>
+          <a:lnRef idx="1">
+            <a:schemeClr val="accent1"/>
+          </a:lnRef>
+          <a:fillRef idx="0">
+            <a:schemeClr val="accent1"/>
+          </a:fillRef>
+          <a:effectRef idx="0">
+            <a:schemeClr val="accent1"/>
+          </a:effectRef>
+          <a:fontRef idx="minor">
+            <a:schemeClr val="tx1"/>
+          </a:fontRef>
+        </p:style>
+      </p:cxnSp>
+      <p:cxnSp>
+        <p:nvCxnSpPr>
+          <p:cNvPr id="10" name="Straight Connector 9"/>
+          <p:cNvCxnSpPr/>
+          <p:nvPr/>
+        </p:nvCxnSpPr>
+        <p:spPr>
+          <a:xfrm flipH="1" flipV="1">
+            <a:off x="7850909" y="3934691"/>
+            <a:ext cx="775855" cy="295564"/>
+          </a:xfrm>
+          <a:prstGeom prst="line">
+            <a:avLst/>
+          </a:prstGeom>
+          <a:ln w="38100">
+            <a:solidFill>
+              <a:srgbClr val="FFFF00"/>
+            </a:solidFill>
+          </a:ln>
+        </p:spPr>
+        <p:style>
+          <a:lnRef idx="1">
+            <a:schemeClr val="accent1"/>
+          </a:lnRef>
+          <a:fillRef idx="0">
+            <a:schemeClr val="accent1"/>
+          </a:fillRef>
+          <a:effectRef idx="0">
+            <a:schemeClr val="accent1"/>
+          </a:effectRef>
+          <a:fontRef idx="minor">
+            <a:schemeClr val="tx1"/>
+          </a:fontRef>
+        </p:style>
+      </p:cxnSp>
+      <p:sp>
+        <p:nvSpPr>
+          <p:cNvPr id="11" name="Arc 10"/>
+          <p:cNvSpPr/>
+          <p:nvPr/>
+        </p:nvSpPr>
+        <p:spPr>
+          <a:xfrm rot="2603511">
+            <a:off x="6602887" y="2595828"/>
+            <a:ext cx="1698845" cy="1698669"/>
+          </a:xfrm>
+          <a:prstGeom prst="arc">
+            <a:avLst/>
+          </a:prstGeom>
+          <a:ln w="38100">
+            <a:solidFill>
+              <a:srgbClr val="FFFF00"/>
+            </a:solidFill>
+            <a:headEnd type="triangle" w="med" len="med"/>
+            <a:tailEnd type="none" w="med" len="med"/>
+          </a:ln>
+        </p:spPr>
+        <p:style>
+          <a:lnRef idx="1">
+            <a:schemeClr val="accent1"/>
+          </a:lnRef>
+          <a:fillRef idx="0">
+            <a:schemeClr val="accent1"/>
+          </a:fillRef>
+          <a:effectRef idx="0">
+            <a:schemeClr val="accent1"/>
+          </a:effectRef>
+          <a:fontRef idx="minor">
+            <a:schemeClr val="tx1"/>
+          </a:fontRef>
+        </p:style>
+        <p:txBody>
+          <a:bodyPr rtlCol="0" anchor="ctr"/>
+          <a:lstStyle/>
+          <a:p>
+            <a:pPr algn="ctr"/>
+            <a:endParaRPr lang="en-CA"/>
+          </a:p>
+        </p:txBody>
+      </p:sp>
     </p:spTree>
     <p:extLst>
       <p:ext uri="{BB962C8B-B14F-4D97-AF65-F5344CB8AC3E}">
-        <p14:creationId xmlns:p14="http://schemas.microsoft.com/office/powerpoint/2010/main" val="1056806276"/>
+        <p14:creationId xmlns:p14="http://schemas.microsoft.com/office/powerpoint/2010/main" val="1379066884"/>
       </p:ext>
     </p:extLst>
   </p:cSld>
   <p:clrMapOvr>
     <a:masterClrMapping/>
   </p:clrMapOvr>
+  <p:timing>
+    <p:tnLst>
+      <p:par>
+        <p:cTn id="1" dur="indefinite" restart="never" nodeType="tmRoot">
+          <p:childTnLst>
+            <p:seq concurrent="1" nextAc="seek">
+              <p:cTn id="2" dur="indefinite" nodeType="mainSeq">
+                <p:childTnLst>
+                  <p:par>
+                    <p:cTn id="3" fill="hold">
+                      <p:stCondLst>
+                        <p:cond delay="indefinite"/>
+                      </p:stCondLst>
+                      <p:childTnLst>
+                        <p:par>
+                          <p:cTn id="4" fill="hold">
+                            <p:stCondLst>
+                              <p:cond delay="0"/>
+                            </p:stCondLst>
+                            <p:childTnLst>
+                              <p:par>
+                                <p:cTn id="5" presetID="10" presetClass="entr" presetSubtype="0" fill="hold" nodeType="clickEffect">
+                                  <p:stCondLst>
+                                    <p:cond delay="0"/>
+                                  </p:stCondLst>
+                                  <p:childTnLst>
+                                    <p:set>
+                                      <p:cBhvr>
+                                        <p:cTn id="6" dur="1" fill="hold">
+                                          <p:stCondLst>
+                                            <p:cond delay="0"/>
+                                          </p:stCondLst>
+                                        </p:cTn>
+                                        <p:tgtEl>
+                                          <p:spTgt spid="3">
+                                            <p:txEl>
+                                              <p:pRg st="0" end="0"/>
+                                            </p:txEl>
+                                          </p:spTgt>
+                                        </p:tgtEl>
+                                        <p:attrNameLst>
+                                          <p:attrName>style.visibility</p:attrName>
+                                        </p:attrNameLst>
+                                      </p:cBhvr>
+                                      <p:to>
+                                        <p:strVal val="visible"/>
+                                      </p:to>
+                                    </p:set>
+                                    <p:animEffect transition="in" filter="fade">
+                                      <p:cBhvr>
+                                        <p:cTn id="7" dur="1000"/>
+                                        <p:tgtEl>
+                                          <p:spTgt spid="3">
+                                            <p:txEl>
+                                              <p:pRg st="0" end="0"/>
+                                            </p:txEl>
+                                          </p:spTgt>
+                                        </p:tgtEl>
+                                      </p:cBhvr>
+                                    </p:animEffect>
+                                  </p:childTnLst>
+                                </p:cTn>
+                              </p:par>
+                            </p:childTnLst>
+                          </p:cTn>
+                        </p:par>
+                      </p:childTnLst>
+                    </p:cTn>
+                  </p:par>
+                  <p:par>
+                    <p:cTn id="8" fill="hold">
+                      <p:stCondLst>
+                        <p:cond delay="indefinite"/>
+                      </p:stCondLst>
+                      <p:childTnLst>
+                        <p:par>
+                          <p:cTn id="9" fill="hold">
+                            <p:stCondLst>
+                              <p:cond delay="0"/>
+                            </p:stCondLst>
+                            <p:childTnLst>
+                              <p:par>
+                                <p:cTn id="10" presetID="10" presetClass="entr" presetSubtype="0" fill="hold" nodeType="clickEffect">
+                                  <p:stCondLst>
+                                    <p:cond delay="0"/>
+                                  </p:stCondLst>
+                                  <p:childTnLst>
+                                    <p:set>
+                                      <p:cBhvr>
+                                        <p:cTn id="11" dur="1" fill="hold">
+                                          <p:stCondLst>
+                                            <p:cond delay="0"/>
+                                          </p:stCondLst>
+                                        </p:cTn>
+                                        <p:tgtEl>
+                                          <p:spTgt spid="6"/>
+                                        </p:tgtEl>
+                                        <p:attrNameLst>
+                                          <p:attrName>style.visibility</p:attrName>
+                                        </p:attrNameLst>
+                                      </p:cBhvr>
+                                      <p:to>
+                                        <p:strVal val="visible"/>
+                                      </p:to>
+                                    </p:set>
+                                    <p:animEffect transition="in" filter="fade">
+                                      <p:cBhvr>
+                                        <p:cTn id="12" dur="1000"/>
+                                        <p:tgtEl>
+                                          <p:spTgt spid="6"/>
+                                        </p:tgtEl>
+                                      </p:cBhvr>
+                                    </p:animEffect>
+                                  </p:childTnLst>
+                                </p:cTn>
+                              </p:par>
+                            </p:childTnLst>
+                          </p:cTn>
+                        </p:par>
+                      </p:childTnLst>
+                    </p:cTn>
+                  </p:par>
+                  <p:par>
+                    <p:cTn id="13" fill="hold">
+                      <p:stCondLst>
+                        <p:cond delay="indefinite"/>
+                      </p:stCondLst>
+                      <p:childTnLst>
+                        <p:par>
+                          <p:cTn id="14" fill="hold">
+                            <p:stCondLst>
+                              <p:cond delay="0"/>
+                            </p:stCondLst>
+                            <p:childTnLst>
+                              <p:par>
+                                <p:cTn id="15" presetID="10" presetClass="entr" presetSubtype="0" fill="hold" nodeType="clickEffect">
+                                  <p:stCondLst>
+                                    <p:cond delay="0"/>
+                                  </p:stCondLst>
+                                  <p:childTnLst>
+                                    <p:set>
+                                      <p:cBhvr>
+                                        <p:cTn id="16" dur="1" fill="hold">
+                                          <p:stCondLst>
+                                            <p:cond delay="0"/>
+                                          </p:stCondLst>
+                                        </p:cTn>
+                                        <p:tgtEl>
+                                          <p:spTgt spid="3">
+                                            <p:txEl>
+                                              <p:pRg st="1" end="1"/>
+                                            </p:txEl>
+                                          </p:spTgt>
+                                        </p:tgtEl>
+                                        <p:attrNameLst>
+                                          <p:attrName>style.visibility</p:attrName>
+                                        </p:attrNameLst>
+                                      </p:cBhvr>
+                                      <p:to>
+                                        <p:strVal val="visible"/>
+                                      </p:to>
+                                    </p:set>
+                                    <p:animEffect transition="in" filter="fade">
+                                      <p:cBhvr>
+                                        <p:cTn id="17" dur="1000"/>
+                                        <p:tgtEl>
+                                          <p:spTgt spid="3">
+                                            <p:txEl>
+                                              <p:pRg st="1" end="1"/>
+                                            </p:txEl>
+                                          </p:spTgt>
+                                        </p:tgtEl>
+                                      </p:cBhvr>
+                                    </p:animEffect>
+                                  </p:childTnLst>
+                                </p:cTn>
+                              </p:par>
+                            </p:childTnLst>
+                          </p:cTn>
+                        </p:par>
+                      </p:childTnLst>
+                    </p:cTn>
+                  </p:par>
+                  <p:par>
+                    <p:cTn id="18" fill="hold">
+                      <p:stCondLst>
+                        <p:cond delay="indefinite"/>
+                      </p:stCondLst>
+                      <p:childTnLst>
+                        <p:par>
+                          <p:cTn id="19" fill="hold">
+                            <p:stCondLst>
+                              <p:cond delay="0"/>
+                            </p:stCondLst>
+                            <p:childTnLst>
+                              <p:par>
+                                <p:cTn id="20" presetID="22" presetClass="entr" presetSubtype="2" fill="hold" nodeType="clickEffect">
+                                  <p:stCondLst>
+                                    <p:cond delay="0"/>
+                                  </p:stCondLst>
+                                  <p:childTnLst>
+                                    <p:set>
+                                      <p:cBhvr>
+                                        <p:cTn id="21" dur="1" fill="hold">
+                                          <p:stCondLst>
+                                            <p:cond delay="0"/>
+                                          </p:stCondLst>
+                                        </p:cTn>
+                                        <p:tgtEl>
+                                          <p:spTgt spid="8"/>
+                                        </p:tgtEl>
+                                        <p:attrNameLst>
+                                          <p:attrName>style.visibility</p:attrName>
+                                        </p:attrNameLst>
+                                      </p:cBhvr>
+                                      <p:to>
+                                        <p:strVal val="visible"/>
+                                      </p:to>
+                                    </p:set>
+                                    <p:animEffect transition="in" filter="wipe(right)">
+                                      <p:cBhvr>
+                                        <p:cTn id="22" dur="1000"/>
+                                        <p:tgtEl>
+                                          <p:spTgt spid="8"/>
+                                        </p:tgtEl>
+                                      </p:cBhvr>
+                                    </p:animEffect>
+                                  </p:childTnLst>
+                                </p:cTn>
+                              </p:par>
+                              <p:par>
+                                <p:cTn id="23" presetID="22" presetClass="entr" presetSubtype="2" fill="hold" nodeType="withEffect">
+                                  <p:stCondLst>
+                                    <p:cond delay="500"/>
+                                  </p:stCondLst>
+                                  <p:childTnLst>
+                                    <p:set>
+                                      <p:cBhvr>
+                                        <p:cTn id="24" dur="1" fill="hold">
+                                          <p:stCondLst>
+                                            <p:cond delay="0"/>
+                                          </p:stCondLst>
+                                        </p:cTn>
+                                        <p:tgtEl>
+                                          <p:spTgt spid="10"/>
+                                        </p:tgtEl>
+                                        <p:attrNameLst>
+                                          <p:attrName>style.visibility</p:attrName>
+                                        </p:attrNameLst>
+                                      </p:cBhvr>
+                                      <p:to>
+                                        <p:strVal val="visible"/>
+                                      </p:to>
+                                    </p:set>
+                                    <p:animEffect transition="in" filter="wipe(right)">
+                                      <p:cBhvr>
+                                        <p:cTn id="25" dur="1000"/>
+                                        <p:tgtEl>
+                                          <p:spTgt spid="10"/>
+                                        </p:tgtEl>
+                                      </p:cBhvr>
+                                    </p:animEffect>
+                                  </p:childTnLst>
+                                </p:cTn>
+                              </p:par>
+                              <p:par>
+                                <p:cTn id="26" presetID="22" presetClass="entr" presetSubtype="4" fill="hold" grpId="0" nodeType="withEffect">
+                                  <p:stCondLst>
+                                    <p:cond delay="1000"/>
+                                  </p:stCondLst>
+                                  <p:childTnLst>
+                                    <p:set>
+                                      <p:cBhvr>
+                                        <p:cTn id="27" dur="1" fill="hold">
+                                          <p:stCondLst>
+                                            <p:cond delay="0"/>
+                                          </p:stCondLst>
+                                        </p:cTn>
+                                        <p:tgtEl>
+                                          <p:spTgt spid="11"/>
+                                        </p:tgtEl>
+                                        <p:attrNameLst>
+                                          <p:attrName>style.visibility</p:attrName>
+                                        </p:attrNameLst>
+                                      </p:cBhvr>
+                                      <p:to>
+                                        <p:strVal val="visible"/>
+                                      </p:to>
+                                    </p:set>
+                                    <p:animEffect transition="in" filter="wipe(down)">
+                                      <p:cBhvr>
+                                        <p:cTn id="28" dur="1000"/>
+                                        <p:tgtEl>
+                                          <p:spTgt spid="11"/>
+                                        </p:tgtEl>
+                                      </p:cBhvr>
+                                    </p:animEffect>
+                                  </p:childTnLst>
+                                </p:cTn>
+                              </p:par>
+                            </p:childTnLst>
+                          </p:cTn>
+                        </p:par>
+                      </p:childTnLst>
+                    </p:cTn>
+                  </p:par>
+                </p:childTnLst>
+              </p:cTn>
+              <p:prevCondLst>
+                <p:cond evt="onPrev" delay="0">
+                  <p:tgtEl>
+                    <p:sldTgt/>
+                  </p:tgtEl>
+                </p:cond>
+              </p:prevCondLst>
+              <p:nextCondLst>
+                <p:cond evt="onNext" delay="0">
+                  <p:tgtEl>
+                    <p:sldTgt/>
+                  </p:tgtEl>
+                </p:cond>
+              </p:nextCondLst>
+            </p:seq>
+          </p:childTnLst>
+        </p:cTn>
+      </p:par>
+    </p:tnLst>
+    <p:bldLst>
+      <p:bldP spid="11" grpId="0" animBg="1"/>
+    </p:bldLst>
+  </p:timing>
 </p:sld>
 </file>
 
@@ -8213,6 +9509,65 @@
           <a:chExt cx="0" cy="0"/>
         </a:xfrm>
       </p:grpSpPr>
+      <p:pic>
+        <p:nvPicPr>
+          <p:cNvPr id="8" name="Picture 7"/>
+          <p:cNvPicPr>
+            <a:picLocks noChangeAspect="1"/>
+          </p:cNvPicPr>
+          <p:nvPr/>
+        </p:nvPicPr>
+        <p:blipFill rotWithShape="1">
+          <a:blip r:embed="rId2">
+            <a:extLst>
+              <a:ext uri="{28A0092B-C50C-407E-A947-70E740481C1C}">
+                <a14:useLocalDpi xmlns:a14="http://schemas.microsoft.com/office/drawing/2010/main" val="0"/>
+              </a:ext>
+            </a:extLst>
+          </a:blip>
+          <a:srcRect l="27948" t="1252" r="28927" b="2370"/>
+          <a:stretch/>
+        </p:blipFill>
+        <p:spPr>
+          <a:xfrm>
+            <a:off x="7380514" y="1698171"/>
+            <a:ext cx="2536372" cy="4691743"/>
+          </a:xfrm>
+          <a:prstGeom prst="rect">
+            <a:avLst/>
+          </a:prstGeom>
+          <a:solidFill>
+            <a:srgbClr val="FFFFFF">
+              <a:shade val="85000"/>
+            </a:srgbClr>
+          </a:solidFill>
+          <a:ln w="76200" cap="sq">
+            <a:solidFill>
+              <a:srgbClr val="FFFFFF"/>
+            </a:solidFill>
+            <a:miter lim="800000"/>
+          </a:ln>
+          <a:effectLst>
+            <a:outerShdw blurRad="55000" dist="18000" dir="5400000" algn="tl" rotWithShape="0">
+              <a:srgbClr val="000000">
+                <a:alpha val="40000"/>
+              </a:srgbClr>
+            </a:outerShdw>
+          </a:effectLst>
+          <a:scene3d>
+            <a:camera prst="orthographicFront"/>
+            <a:lightRig rig="twoPt" dir="t">
+              <a:rot lat="0" lon="0" rev="7200000"/>
+            </a:lightRig>
+          </a:scene3d>
+          <a:sp3d>
+            <a:bevelT w="25400" h="19050"/>
+            <a:contourClr>
+              <a:srgbClr val="FFFFFF"/>
+            </a:contourClr>
+          </a:sp3d>
+        </p:spPr>
+      </p:pic>
       <p:sp>
         <p:nvSpPr>
           <p:cNvPr id="2" name="Title 1"/>
@@ -8225,14 +9580,16 @@
         </p:nvSpPr>
         <p:spPr/>
         <p:txBody>
-          <a:bodyPr/>
+          <a:bodyPr>
+            <a:normAutofit/>
+          </a:bodyPr>
           <a:lstStyle/>
           <a:p>
             <a:r>
-              <a:rPr lang="en-CA" dirty="0" smtClean="0"/>
-              <a:t>Methods – Pre-processing</a:t>
-            </a:r>
-            <a:endParaRPr lang="en-CA" dirty="0"/>
+              <a:rPr lang="en-CA" sz="4800" dirty="0" smtClean="0"/>
+              <a:t>Background – Tracked ultrasound</a:t>
+            </a:r>
+            <a:endParaRPr lang="en-CA" sz="4800" dirty="0"/>
           </a:p>
         </p:txBody>
       </p:sp>
@@ -8246,12 +9603,56 @@
             <p:ph idx="1"/>
           </p:nvPr>
         </p:nvSpPr>
-        <p:spPr/>
-        <p:txBody>
-          <a:bodyPr/>
+        <p:spPr>
+          <a:xfrm>
+            <a:off x="680321" y="2336873"/>
+            <a:ext cx="4832205" cy="3599316"/>
+          </a:xfrm>
+        </p:spPr>
+        <p:txBody>
+          <a:bodyPr>
+            <a:normAutofit/>
+          </a:bodyPr>
           <a:lstStyle/>
           <a:p>
-            <a:endParaRPr lang="en-CA" dirty="0">
+            <a:r>
+              <a:rPr lang="en-CA" sz="2800" dirty="0" smtClean="0">
+                <a:solidFill>
+                  <a:schemeClr val="bg1">
+                    <a:lumMod val="95000"/>
+                    <a:lumOff val="5000"/>
+                  </a:schemeClr>
+                </a:solidFill>
+              </a:rPr>
+              <a:t>Risks of cumulative X-ray exposure have motivated use of 3D ultrasound</a:t>
+            </a:r>
+          </a:p>
+          <a:p>
+            <a:r>
+              <a:rPr lang="en-CA" sz="2800" dirty="0" smtClean="0">
+                <a:solidFill>
+                  <a:schemeClr val="bg1">
+                    <a:lumMod val="95000"/>
+                    <a:lumOff val="5000"/>
+                  </a:schemeClr>
+                </a:solidFill>
+              </a:rPr>
+              <a:t>Provides landmark locations rather than macroscopic visualization</a:t>
+            </a:r>
+          </a:p>
+          <a:p>
+            <a:r>
+              <a:rPr lang="en-CA" sz="2800" dirty="0" smtClean="0">
+                <a:solidFill>
+                  <a:schemeClr val="bg1">
+                    <a:lumMod val="95000"/>
+                    <a:lumOff val="5000"/>
+                  </a:schemeClr>
+                </a:solidFill>
+              </a:rPr>
+              <a:t>Curvature extracted from landmark locations</a:t>
+            </a:r>
+            <a:endParaRPr lang="en-CA" sz="2800" dirty="0">
               <a:solidFill>
                 <a:schemeClr val="bg1">
                   <a:lumMod val="95000"/>
@@ -8262,16 +9663,680 @@
           </a:p>
         </p:txBody>
       </p:sp>
+      <p:pic>
+        <p:nvPicPr>
+          <p:cNvPr id="4" name="Picture 3"/>
+          <p:cNvPicPr>
+            <a:picLocks noChangeAspect="1"/>
+          </p:cNvPicPr>
+          <p:nvPr/>
+        </p:nvPicPr>
+        <p:blipFill rotWithShape="1">
+          <a:blip r:embed="rId3">
+            <a:extLst>
+              <a:ext uri="{28A0092B-C50C-407E-A947-70E740481C1C}">
+                <a14:useLocalDpi xmlns:a14="http://schemas.microsoft.com/office/drawing/2010/main" val="0"/>
+              </a:ext>
+            </a:extLst>
+          </a:blip>
+          <a:srcRect l="26319" t="1143" r="26779" b="2095"/>
+          <a:stretch/>
+        </p:blipFill>
+        <p:spPr>
+          <a:xfrm>
+            <a:off x="7376159" y="1692789"/>
+            <a:ext cx="2525487" cy="4716720"/>
+          </a:xfrm>
+          <a:prstGeom prst="rect">
+            <a:avLst/>
+          </a:prstGeom>
+          <a:solidFill>
+            <a:srgbClr val="FFFFFF">
+              <a:shade val="85000"/>
+            </a:srgbClr>
+          </a:solidFill>
+          <a:ln w="76200" cap="sq">
+            <a:solidFill>
+              <a:srgbClr val="FFFFFF"/>
+            </a:solidFill>
+            <a:miter lim="800000"/>
+          </a:ln>
+          <a:effectLst>
+            <a:outerShdw blurRad="55000" dist="18000" dir="5400000" algn="tl" rotWithShape="0">
+              <a:srgbClr val="000000">
+                <a:alpha val="40000"/>
+              </a:srgbClr>
+            </a:outerShdw>
+          </a:effectLst>
+          <a:scene3d>
+            <a:camera prst="orthographicFront"/>
+            <a:lightRig rig="twoPt" dir="t">
+              <a:rot lat="0" lon="0" rev="7200000"/>
+            </a:lightRig>
+          </a:scene3d>
+          <a:sp3d>
+            <a:bevelT w="25400" h="19050"/>
+            <a:contourClr>
+              <a:srgbClr val="FFFFFF"/>
+            </a:contourClr>
+          </a:sp3d>
+        </p:spPr>
+      </p:pic>
+      <p:pic>
+        <p:nvPicPr>
+          <p:cNvPr id="5" name="Picture 4"/>
+          <p:cNvPicPr>
+            <a:picLocks noChangeAspect="1"/>
+          </p:cNvPicPr>
+          <p:nvPr/>
+        </p:nvPicPr>
+        <p:blipFill>
+          <a:blip r:embed="rId4">
+            <a:extLst>
+              <a:ext uri="{28A0092B-C50C-407E-A947-70E740481C1C}">
+                <a14:useLocalDpi xmlns:a14="http://schemas.microsoft.com/office/drawing/2010/main" val="0"/>
+              </a:ext>
+            </a:extLst>
+          </a:blip>
+          <a:stretch>
+            <a:fillRect/>
+          </a:stretch>
+        </p:blipFill>
+        <p:spPr>
+          <a:xfrm>
+            <a:off x="7418537" y="1692789"/>
+            <a:ext cx="2440731" cy="4716720"/>
+          </a:xfrm>
+          <a:prstGeom prst="rect">
+            <a:avLst/>
+          </a:prstGeom>
+          <a:solidFill>
+            <a:srgbClr val="FFFFFF">
+              <a:shade val="85000"/>
+            </a:srgbClr>
+          </a:solidFill>
+          <a:ln w="76200" cap="sq">
+            <a:solidFill>
+              <a:srgbClr val="FFFFFF"/>
+            </a:solidFill>
+            <a:miter lim="800000"/>
+          </a:ln>
+          <a:effectLst>
+            <a:outerShdw blurRad="55000" dist="18000" dir="5400000" algn="tl" rotWithShape="0">
+              <a:srgbClr val="000000">
+                <a:alpha val="40000"/>
+              </a:srgbClr>
+            </a:outerShdw>
+          </a:effectLst>
+          <a:scene3d>
+            <a:camera prst="orthographicFront"/>
+            <a:lightRig rig="twoPt" dir="t">
+              <a:rot lat="0" lon="0" rev="7200000"/>
+            </a:lightRig>
+          </a:scene3d>
+          <a:sp3d>
+            <a:bevelT w="25400" h="19050"/>
+            <a:contourClr>
+              <a:srgbClr val="FFFFFF"/>
+            </a:contourClr>
+          </a:sp3d>
+        </p:spPr>
+      </p:pic>
+      <p:pic>
+        <p:nvPicPr>
+          <p:cNvPr id="7" name="Picture 6"/>
+          <p:cNvPicPr>
+            <a:picLocks noChangeAspect="1"/>
+          </p:cNvPicPr>
+          <p:nvPr/>
+        </p:nvPicPr>
+        <p:blipFill rotWithShape="1">
+          <a:blip r:embed="rId5">
+            <a:extLst>
+              <a:ext uri="{28A0092B-C50C-407E-A947-70E740481C1C}">
+                <a14:useLocalDpi xmlns:a14="http://schemas.microsoft.com/office/drawing/2010/main" val="0"/>
+              </a:ext>
+            </a:extLst>
+          </a:blip>
+          <a:srcRect l="28090" t="991" r="28711" b="2240"/>
+          <a:stretch/>
+        </p:blipFill>
+        <p:spPr>
+          <a:xfrm>
+            <a:off x="7369629" y="1687286"/>
+            <a:ext cx="2536371" cy="4702628"/>
+          </a:xfrm>
+          <a:prstGeom prst="rect">
+            <a:avLst/>
+          </a:prstGeom>
+          <a:solidFill>
+            <a:srgbClr val="FFFFFF">
+              <a:shade val="85000"/>
+            </a:srgbClr>
+          </a:solidFill>
+          <a:ln w="76200" cap="sq">
+            <a:solidFill>
+              <a:srgbClr val="FFFFFF"/>
+            </a:solidFill>
+            <a:miter lim="800000"/>
+          </a:ln>
+          <a:effectLst>
+            <a:outerShdw blurRad="55000" dist="18000" dir="5400000" algn="tl" rotWithShape="0">
+              <a:srgbClr val="000000">
+                <a:alpha val="40000"/>
+              </a:srgbClr>
+            </a:outerShdw>
+          </a:effectLst>
+          <a:scene3d>
+            <a:camera prst="orthographicFront"/>
+            <a:lightRig rig="twoPt" dir="t">
+              <a:rot lat="0" lon="0" rev="7200000"/>
+            </a:lightRig>
+          </a:scene3d>
+          <a:sp3d>
+            <a:bevelT w="25400" h="19050"/>
+            <a:contourClr>
+              <a:srgbClr val="FFFFFF"/>
+            </a:contourClr>
+          </a:sp3d>
+        </p:spPr>
+      </p:pic>
+      <p:cxnSp>
+        <p:nvCxnSpPr>
+          <p:cNvPr id="10" name="Straight Connector 9"/>
+          <p:cNvCxnSpPr/>
+          <p:nvPr/>
+        </p:nvCxnSpPr>
+        <p:spPr>
+          <a:xfrm flipH="1">
+            <a:off x="8436429" y="2612571"/>
+            <a:ext cx="664028" cy="195943"/>
+          </a:xfrm>
+          <a:prstGeom prst="line">
+            <a:avLst/>
+          </a:prstGeom>
+          <a:ln w="38100">
+            <a:solidFill>
+              <a:srgbClr val="FFFF00"/>
+            </a:solidFill>
+          </a:ln>
+        </p:spPr>
+        <p:style>
+          <a:lnRef idx="1">
+            <a:schemeClr val="accent1"/>
+          </a:lnRef>
+          <a:fillRef idx="0">
+            <a:schemeClr val="accent1"/>
+          </a:fillRef>
+          <a:effectRef idx="0">
+            <a:schemeClr val="accent1"/>
+          </a:effectRef>
+          <a:fontRef idx="minor">
+            <a:schemeClr val="tx1"/>
+          </a:fontRef>
+        </p:style>
+      </p:cxnSp>
+      <p:cxnSp>
+        <p:nvCxnSpPr>
+          <p:cNvPr id="12" name="Straight Connector 11"/>
+          <p:cNvCxnSpPr/>
+          <p:nvPr/>
+        </p:nvCxnSpPr>
+        <p:spPr>
+          <a:xfrm flipH="1" flipV="1">
+            <a:off x="8414657" y="4343400"/>
+            <a:ext cx="511629" cy="163286"/>
+          </a:xfrm>
+          <a:prstGeom prst="line">
+            <a:avLst/>
+          </a:prstGeom>
+          <a:ln w="38100">
+            <a:solidFill>
+              <a:srgbClr val="FFFF00"/>
+            </a:solidFill>
+          </a:ln>
+        </p:spPr>
+        <p:style>
+          <a:lnRef idx="1">
+            <a:schemeClr val="accent1"/>
+          </a:lnRef>
+          <a:fillRef idx="0">
+            <a:schemeClr val="accent1"/>
+          </a:fillRef>
+          <a:effectRef idx="0">
+            <a:schemeClr val="accent1"/>
+          </a:effectRef>
+          <a:fontRef idx="minor">
+            <a:schemeClr val="tx1"/>
+          </a:fontRef>
+        </p:style>
+      </p:cxnSp>
+      <p:sp>
+        <p:nvSpPr>
+          <p:cNvPr id="13" name="Arc 12"/>
+          <p:cNvSpPr/>
+          <p:nvPr/>
+        </p:nvSpPr>
+        <p:spPr>
+          <a:xfrm rot="1849176">
+            <a:off x="6273969" y="2264240"/>
+            <a:ext cx="2572308" cy="3015630"/>
+          </a:xfrm>
+          <a:prstGeom prst="arc">
+            <a:avLst>
+              <a:gd name="adj1" fmla="val 17125809"/>
+              <a:gd name="adj2" fmla="val 21517440"/>
+            </a:avLst>
+          </a:prstGeom>
+          <a:ln w="38100">
+            <a:solidFill>
+              <a:srgbClr val="FFFF00"/>
+            </a:solidFill>
+            <a:headEnd type="triangle" w="med" len="med"/>
+            <a:tailEnd type="none" w="med" len="med"/>
+          </a:ln>
+        </p:spPr>
+        <p:style>
+          <a:lnRef idx="1">
+            <a:schemeClr val="accent1"/>
+          </a:lnRef>
+          <a:fillRef idx="0">
+            <a:schemeClr val="accent1"/>
+          </a:fillRef>
+          <a:effectRef idx="0">
+            <a:schemeClr val="accent1"/>
+          </a:effectRef>
+          <a:fontRef idx="minor">
+            <a:schemeClr val="tx1"/>
+          </a:fontRef>
+        </p:style>
+        <p:txBody>
+          <a:bodyPr rtlCol="0" anchor="ctr"/>
+          <a:lstStyle/>
+          <a:p>
+            <a:pPr algn="ctr"/>
+            <a:endParaRPr lang="en-CA"/>
+          </a:p>
+        </p:txBody>
+      </p:sp>
     </p:spTree>
     <p:extLst>
       <p:ext uri="{BB962C8B-B14F-4D97-AF65-F5344CB8AC3E}">
-        <p14:creationId xmlns:p14="http://schemas.microsoft.com/office/powerpoint/2010/main" val="4115807974"/>
+        <p14:creationId xmlns:p14="http://schemas.microsoft.com/office/powerpoint/2010/main" val="237159834"/>
       </p:ext>
     </p:extLst>
   </p:cSld>
   <p:clrMapOvr>
     <a:masterClrMapping/>
   </p:clrMapOvr>
+  <p:timing>
+    <p:tnLst>
+      <p:par>
+        <p:cTn id="1" dur="indefinite" restart="never" nodeType="tmRoot">
+          <p:childTnLst>
+            <p:seq concurrent="1" nextAc="seek">
+              <p:cTn id="2" dur="indefinite" nodeType="mainSeq">
+                <p:childTnLst>
+                  <p:par>
+                    <p:cTn id="3" fill="hold">
+                      <p:stCondLst>
+                        <p:cond delay="indefinite"/>
+                      </p:stCondLst>
+                      <p:childTnLst>
+                        <p:par>
+                          <p:cTn id="4" fill="hold">
+                            <p:stCondLst>
+                              <p:cond delay="0"/>
+                            </p:stCondLst>
+                            <p:childTnLst>
+                              <p:par>
+                                <p:cTn id="5" presetID="10" presetClass="exit" presetSubtype="0" fill="hold" nodeType="clickEffect">
+                                  <p:stCondLst>
+                                    <p:cond delay="0"/>
+                                  </p:stCondLst>
+                                  <p:childTnLst>
+                                    <p:animEffect transition="out" filter="fade">
+                                      <p:cBhvr>
+                                        <p:cTn id="6" dur="1000"/>
+                                        <p:tgtEl>
+                                          <p:spTgt spid="5"/>
+                                        </p:tgtEl>
+                                      </p:cBhvr>
+                                    </p:animEffect>
+                                    <p:set>
+                                      <p:cBhvr>
+                                        <p:cTn id="7" dur="1" fill="hold">
+                                          <p:stCondLst>
+                                            <p:cond delay="999"/>
+                                          </p:stCondLst>
+                                        </p:cTn>
+                                        <p:tgtEl>
+                                          <p:spTgt spid="5"/>
+                                        </p:tgtEl>
+                                        <p:attrNameLst>
+                                          <p:attrName>style.visibility</p:attrName>
+                                        </p:attrNameLst>
+                                      </p:cBhvr>
+                                      <p:to>
+                                        <p:strVal val="hidden"/>
+                                      </p:to>
+                                    </p:set>
+                                  </p:childTnLst>
+                                </p:cTn>
+                              </p:par>
+                            </p:childTnLst>
+                          </p:cTn>
+                        </p:par>
+                      </p:childTnLst>
+                    </p:cTn>
+                  </p:par>
+                  <p:par>
+                    <p:cTn id="8" fill="hold">
+                      <p:stCondLst>
+                        <p:cond delay="indefinite"/>
+                      </p:stCondLst>
+                      <p:childTnLst>
+                        <p:par>
+                          <p:cTn id="9" fill="hold">
+                            <p:stCondLst>
+                              <p:cond delay="0"/>
+                            </p:stCondLst>
+                            <p:childTnLst>
+                              <p:par>
+                                <p:cTn id="10" presetID="10" presetClass="entr" presetSubtype="0" fill="hold" nodeType="clickEffect">
+                                  <p:stCondLst>
+                                    <p:cond delay="0"/>
+                                  </p:stCondLst>
+                                  <p:childTnLst>
+                                    <p:set>
+                                      <p:cBhvr>
+                                        <p:cTn id="11" dur="1" fill="hold">
+                                          <p:stCondLst>
+                                            <p:cond delay="0"/>
+                                          </p:stCondLst>
+                                        </p:cTn>
+                                        <p:tgtEl>
+                                          <p:spTgt spid="7"/>
+                                        </p:tgtEl>
+                                        <p:attrNameLst>
+                                          <p:attrName>style.visibility</p:attrName>
+                                        </p:attrNameLst>
+                                      </p:cBhvr>
+                                      <p:to>
+                                        <p:strVal val="visible"/>
+                                      </p:to>
+                                    </p:set>
+                                    <p:animEffect transition="in" filter="fade">
+                                      <p:cBhvr>
+                                        <p:cTn id="12" dur="1000"/>
+                                        <p:tgtEl>
+                                          <p:spTgt spid="7"/>
+                                        </p:tgtEl>
+                                      </p:cBhvr>
+                                    </p:animEffect>
+                                  </p:childTnLst>
+                                </p:cTn>
+                              </p:par>
+                            </p:childTnLst>
+                          </p:cTn>
+                        </p:par>
+                      </p:childTnLst>
+                    </p:cTn>
+                  </p:par>
+                  <p:par>
+                    <p:cTn id="13" fill="hold">
+                      <p:stCondLst>
+                        <p:cond delay="indefinite"/>
+                      </p:stCondLst>
+                      <p:childTnLst>
+                        <p:par>
+                          <p:cTn id="14" fill="hold">
+                            <p:stCondLst>
+                              <p:cond delay="0"/>
+                            </p:stCondLst>
+                            <p:childTnLst>
+                              <p:par>
+                                <p:cTn id="15" presetID="10" presetClass="exit" presetSubtype="0" fill="hold" nodeType="clickEffect">
+                                  <p:stCondLst>
+                                    <p:cond delay="0"/>
+                                  </p:stCondLst>
+                                  <p:childTnLst>
+                                    <p:animEffect transition="out" filter="fade">
+                                      <p:cBhvr>
+                                        <p:cTn id="16" dur="1000"/>
+                                        <p:tgtEl>
+                                          <p:spTgt spid="4"/>
+                                        </p:tgtEl>
+                                      </p:cBhvr>
+                                    </p:animEffect>
+                                    <p:set>
+                                      <p:cBhvr>
+                                        <p:cTn id="17" dur="1" fill="hold">
+                                          <p:stCondLst>
+                                            <p:cond delay="999"/>
+                                          </p:stCondLst>
+                                        </p:cTn>
+                                        <p:tgtEl>
+                                          <p:spTgt spid="4"/>
+                                        </p:tgtEl>
+                                        <p:attrNameLst>
+                                          <p:attrName>style.visibility</p:attrName>
+                                        </p:attrNameLst>
+                                      </p:cBhvr>
+                                      <p:to>
+                                        <p:strVal val="hidden"/>
+                                      </p:to>
+                                    </p:set>
+                                  </p:childTnLst>
+                                </p:cTn>
+                              </p:par>
+                            </p:childTnLst>
+                          </p:cTn>
+                        </p:par>
+                      </p:childTnLst>
+                    </p:cTn>
+                  </p:par>
+                  <p:par>
+                    <p:cTn id="18" fill="hold">
+                      <p:stCondLst>
+                        <p:cond delay="indefinite"/>
+                      </p:stCondLst>
+                      <p:childTnLst>
+                        <p:par>
+                          <p:cTn id="19" fill="hold">
+                            <p:stCondLst>
+                              <p:cond delay="0"/>
+                            </p:stCondLst>
+                            <p:childTnLst>
+                              <p:par>
+                                <p:cTn id="20" presetID="10" presetClass="exit" presetSubtype="0" fill="hold" nodeType="clickEffect">
+                                  <p:stCondLst>
+                                    <p:cond delay="0"/>
+                                  </p:stCondLst>
+                                  <p:childTnLst>
+                                    <p:animEffect transition="out" filter="fade">
+                                      <p:cBhvr>
+                                        <p:cTn id="21" dur="1000"/>
+                                        <p:tgtEl>
+                                          <p:spTgt spid="7"/>
+                                        </p:tgtEl>
+                                      </p:cBhvr>
+                                    </p:animEffect>
+                                    <p:set>
+                                      <p:cBhvr>
+                                        <p:cTn id="22" dur="1" fill="hold">
+                                          <p:stCondLst>
+                                            <p:cond delay="999"/>
+                                          </p:stCondLst>
+                                        </p:cTn>
+                                        <p:tgtEl>
+                                          <p:spTgt spid="7"/>
+                                        </p:tgtEl>
+                                        <p:attrNameLst>
+                                          <p:attrName>style.visibility</p:attrName>
+                                        </p:attrNameLst>
+                                      </p:cBhvr>
+                                      <p:to>
+                                        <p:strVal val="hidden"/>
+                                      </p:to>
+                                    </p:set>
+                                  </p:childTnLst>
+                                </p:cTn>
+                              </p:par>
+                            </p:childTnLst>
+                          </p:cTn>
+                        </p:par>
+                      </p:childTnLst>
+                    </p:cTn>
+                  </p:par>
+                  <p:par>
+                    <p:cTn id="23" fill="hold">
+                      <p:stCondLst>
+                        <p:cond delay="indefinite"/>
+                      </p:stCondLst>
+                      <p:childTnLst>
+                        <p:par>
+                          <p:cTn id="24" fill="hold">
+                            <p:stCondLst>
+                              <p:cond delay="0"/>
+                            </p:stCondLst>
+                            <p:childTnLst>
+                              <p:par>
+                                <p:cTn id="25" presetID="22" presetClass="entr" presetSubtype="2" fill="hold" nodeType="clickEffect">
+                                  <p:stCondLst>
+                                    <p:cond delay="0"/>
+                                  </p:stCondLst>
+                                  <p:childTnLst>
+                                    <p:set>
+                                      <p:cBhvr>
+                                        <p:cTn id="26" dur="1" fill="hold">
+                                          <p:stCondLst>
+                                            <p:cond delay="0"/>
+                                          </p:stCondLst>
+                                        </p:cTn>
+                                        <p:tgtEl>
+                                          <p:spTgt spid="10"/>
+                                        </p:tgtEl>
+                                        <p:attrNameLst>
+                                          <p:attrName>style.visibility</p:attrName>
+                                        </p:attrNameLst>
+                                      </p:cBhvr>
+                                      <p:to>
+                                        <p:strVal val="visible"/>
+                                      </p:to>
+                                    </p:set>
+                                    <p:animEffect transition="in" filter="wipe(right)">
+                                      <p:cBhvr>
+                                        <p:cTn id="27" dur="1000"/>
+                                        <p:tgtEl>
+                                          <p:spTgt spid="10"/>
+                                        </p:tgtEl>
+                                      </p:cBhvr>
+                                    </p:animEffect>
+                                  </p:childTnLst>
+                                </p:cTn>
+                              </p:par>
+                              <p:par>
+                                <p:cTn id="28" presetID="22" presetClass="entr" presetSubtype="2" fill="hold" nodeType="withEffect">
+                                  <p:stCondLst>
+                                    <p:cond delay="500"/>
+                                  </p:stCondLst>
+                                  <p:childTnLst>
+                                    <p:set>
+                                      <p:cBhvr>
+                                        <p:cTn id="29" dur="1" fill="hold">
+                                          <p:stCondLst>
+                                            <p:cond delay="0"/>
+                                          </p:stCondLst>
+                                        </p:cTn>
+                                        <p:tgtEl>
+                                          <p:spTgt spid="12"/>
+                                        </p:tgtEl>
+                                        <p:attrNameLst>
+                                          <p:attrName>style.visibility</p:attrName>
+                                        </p:attrNameLst>
+                                      </p:cBhvr>
+                                      <p:to>
+                                        <p:strVal val="visible"/>
+                                      </p:to>
+                                    </p:set>
+                                    <p:animEffect transition="in" filter="wipe(right)">
+                                      <p:cBhvr>
+                                        <p:cTn id="30" dur="1000"/>
+                                        <p:tgtEl>
+                                          <p:spTgt spid="12"/>
+                                        </p:tgtEl>
+                                      </p:cBhvr>
+                                    </p:animEffect>
+                                  </p:childTnLst>
+                                </p:cTn>
+                              </p:par>
+                              <p:par>
+                                <p:cTn id="31" presetID="22" presetClass="entr" presetSubtype="4" fill="hold" grpId="0" nodeType="withEffect">
+                                  <p:stCondLst>
+                                    <p:cond delay="1000"/>
+                                  </p:stCondLst>
+                                  <p:childTnLst>
+                                    <p:set>
+                                      <p:cBhvr>
+                                        <p:cTn id="32" dur="1" fill="hold">
+                                          <p:stCondLst>
+                                            <p:cond delay="0"/>
+                                          </p:stCondLst>
+                                        </p:cTn>
+                                        <p:tgtEl>
+                                          <p:spTgt spid="13"/>
+                                        </p:tgtEl>
+                                        <p:attrNameLst>
+                                          <p:attrName>style.visibility</p:attrName>
+                                        </p:attrNameLst>
+                                      </p:cBhvr>
+                                      <p:to>
+                                        <p:strVal val="visible"/>
+                                      </p:to>
+                                    </p:set>
+                                    <p:animEffect transition="in" filter="wipe(down)">
+                                      <p:cBhvr>
+                                        <p:cTn id="33" dur="1000"/>
+                                        <p:tgtEl>
+                                          <p:spTgt spid="13"/>
+                                        </p:tgtEl>
+                                      </p:cBhvr>
+                                    </p:animEffect>
+                                  </p:childTnLst>
+                                </p:cTn>
+                              </p:par>
+                            </p:childTnLst>
+                          </p:cTn>
+                        </p:par>
+                      </p:childTnLst>
+                    </p:cTn>
+                  </p:par>
+                </p:childTnLst>
+              </p:cTn>
+              <p:prevCondLst>
+                <p:cond evt="onPrev" delay="0">
+                  <p:tgtEl>
+                    <p:sldTgt/>
+                  </p:tgtEl>
+                </p:cond>
+              </p:prevCondLst>
+              <p:nextCondLst>
+                <p:cond evt="onNext" delay="0">
+                  <p:tgtEl>
+                    <p:sldTgt/>
+                  </p:tgtEl>
+                </p:cond>
+              </p:nextCondLst>
+            </p:seq>
+          </p:childTnLst>
+        </p:cTn>
+      </p:par>
+    </p:tnLst>
+    <p:bldLst>
+      <p:bldP spid="13" grpId="0" animBg="1"/>
+    </p:bldLst>
+  </p:timing>
 </p:sld>
 </file>
 
@@ -8292,6 +10357,65 @@
           <a:chExt cx="0" cy="0"/>
         </a:xfrm>
       </p:grpSpPr>
+      <p:pic>
+        <p:nvPicPr>
+          <p:cNvPr id="14" name="Picture 13"/>
+          <p:cNvPicPr>
+            <a:picLocks noChangeAspect="1"/>
+          </p:cNvPicPr>
+          <p:nvPr/>
+        </p:nvPicPr>
+        <p:blipFill rotWithShape="1">
+          <a:blip r:embed="rId2">
+            <a:extLst>
+              <a:ext uri="{28A0092B-C50C-407E-A947-70E740481C1C}">
+                <a14:useLocalDpi xmlns:a14="http://schemas.microsoft.com/office/drawing/2010/main" val="0"/>
+              </a:ext>
+            </a:extLst>
+          </a:blip>
+          <a:srcRect l="30683" t="2408" r="30322" b="4201"/>
+          <a:stretch/>
+        </p:blipFill>
+        <p:spPr>
+          <a:xfrm>
+            <a:off x="6256668" y="590310"/>
+            <a:ext cx="3023473" cy="5875804"/>
+          </a:xfrm>
+          <a:prstGeom prst="rect">
+            <a:avLst/>
+          </a:prstGeom>
+          <a:solidFill>
+            <a:srgbClr val="FFFFFF">
+              <a:shade val="85000"/>
+            </a:srgbClr>
+          </a:solidFill>
+          <a:ln w="76200" cap="sq">
+            <a:solidFill>
+              <a:srgbClr val="FFFFFF"/>
+            </a:solidFill>
+            <a:miter lim="800000"/>
+          </a:ln>
+          <a:effectLst>
+            <a:outerShdw blurRad="55000" dist="18000" dir="5400000" algn="tl" rotWithShape="0">
+              <a:srgbClr val="000000">
+                <a:alpha val="40000"/>
+              </a:srgbClr>
+            </a:outerShdw>
+          </a:effectLst>
+          <a:scene3d>
+            <a:camera prst="orthographicFront"/>
+            <a:lightRig rig="twoPt" dir="t">
+              <a:rot lat="0" lon="0" rev="7200000"/>
+            </a:lightRig>
+          </a:scene3d>
+          <a:sp3d>
+            <a:bevelT w="25400" h="19050"/>
+            <a:contourClr>
+              <a:srgbClr val="FFFFFF"/>
+            </a:contourClr>
+          </a:sp3d>
+        </p:spPr>
+      </p:pic>
       <p:sp>
         <p:nvSpPr>
           <p:cNvPr id="2" name="Title 1"/>
@@ -8304,14 +10428,16 @@
         </p:nvSpPr>
         <p:spPr/>
         <p:txBody>
-          <a:bodyPr/>
+          <a:bodyPr>
+            <a:normAutofit/>
+          </a:bodyPr>
           <a:lstStyle/>
           <a:p>
             <a:r>
-              <a:rPr lang="en-CA" dirty="0" smtClean="0"/>
-              <a:t>Methods – Neural network</a:t>
-            </a:r>
-            <a:endParaRPr lang="en-CA" dirty="0"/>
+              <a:rPr lang="en-CA" sz="4800" dirty="0" smtClean="0"/>
+              <a:t>Motivation</a:t>
+            </a:r>
+            <a:endParaRPr lang="en-CA" sz="4800" dirty="0"/>
           </a:p>
         </p:txBody>
       </p:sp>
@@ -8325,12 +10451,72 @@
             <p:ph idx="1"/>
           </p:nvPr>
         </p:nvSpPr>
-        <p:spPr/>
-        <p:txBody>
-          <a:bodyPr/>
+        <p:spPr>
+          <a:xfrm>
+            <a:off x="680321" y="2336873"/>
+            <a:ext cx="4832205" cy="3599316"/>
+          </a:xfrm>
+        </p:spPr>
+        <p:txBody>
+          <a:bodyPr>
+            <a:normAutofit/>
+          </a:bodyPr>
           <a:lstStyle/>
           <a:p>
-            <a:endParaRPr lang="en-CA" dirty="0">
+            <a:pPr marL="0" indent="0">
+              <a:buNone/>
+            </a:pPr>
+            <a:r>
+              <a:rPr lang="en-CA" sz="3600" dirty="0" smtClean="0">
+                <a:solidFill>
+                  <a:schemeClr val="bg1">
+                    <a:lumMod val="95000"/>
+                    <a:lumOff val="5000"/>
+                  </a:schemeClr>
+                </a:solidFill>
+              </a:rPr>
+              <a:t>3 expected error types:</a:t>
+            </a:r>
+          </a:p>
+          <a:p>
+            <a:r>
+              <a:rPr lang="en-CA" sz="2800" dirty="0" smtClean="0">
+                <a:solidFill>
+                  <a:schemeClr val="bg1">
+                    <a:lumMod val="95000"/>
+                    <a:lumOff val="5000"/>
+                  </a:schemeClr>
+                </a:solidFill>
+              </a:rPr>
+              <a:t>Missing points</a:t>
+            </a:r>
+          </a:p>
+          <a:p>
+            <a:r>
+              <a:rPr lang="en-CA" sz="2800" dirty="0" smtClean="0">
+                <a:solidFill>
+                  <a:schemeClr val="bg1">
+                    <a:lumMod val="95000"/>
+                    <a:lumOff val="5000"/>
+                  </a:schemeClr>
+                </a:solidFill>
+              </a:rPr>
+              <a:t>Misplaced points</a:t>
+            </a:r>
+          </a:p>
+          <a:p>
+            <a:r>
+              <a:rPr lang="en-CA" sz="2800" dirty="0" smtClean="0">
+                <a:solidFill>
+                  <a:schemeClr val="bg1">
+                    <a:lumMod val="95000"/>
+                    <a:lumOff val="5000"/>
+                  </a:schemeClr>
+                </a:solidFill>
+              </a:rPr>
+              <a:t>Random noise</a:t>
+            </a:r>
+            <a:endParaRPr lang="en-CA" sz="2800" dirty="0" smtClean="0">
               <a:solidFill>
                 <a:schemeClr val="bg1">
                   <a:lumMod val="95000"/>
@@ -8339,18 +10525,523 @@
               </a:solidFill>
             </a:endParaRPr>
           </a:p>
-        </p:txBody>
-      </p:sp>
+          <a:p>
+            <a:endParaRPr lang="en-CA" sz="2800" dirty="0">
+              <a:solidFill>
+                <a:schemeClr val="bg1">
+                  <a:lumMod val="95000"/>
+                  <a:lumOff val="5000"/>
+                </a:schemeClr>
+              </a:solidFill>
+            </a:endParaRPr>
+          </a:p>
+        </p:txBody>
+      </p:sp>
+      <p:pic>
+        <p:nvPicPr>
+          <p:cNvPr id="13" name="Picture 12"/>
+          <p:cNvPicPr>
+            <a:picLocks noChangeAspect="1"/>
+          </p:cNvPicPr>
+          <p:nvPr/>
+        </p:nvPicPr>
+        <p:blipFill rotWithShape="1">
+          <a:blip r:embed="rId3">
+            <a:extLst>
+              <a:ext uri="{28A0092B-C50C-407E-A947-70E740481C1C}">
+                <a14:useLocalDpi xmlns:a14="http://schemas.microsoft.com/office/drawing/2010/main" val="0"/>
+              </a:ext>
+            </a:extLst>
+          </a:blip>
+          <a:srcRect l="32242" t="6172" r="31884" b="7505"/>
+          <a:stretch/>
+        </p:blipFill>
+        <p:spPr>
+          <a:xfrm>
+            <a:off x="6270172" y="599816"/>
+            <a:ext cx="3004457" cy="5866297"/>
+          </a:xfrm>
+          <a:prstGeom prst="rect">
+            <a:avLst/>
+          </a:prstGeom>
+          <a:solidFill>
+            <a:srgbClr val="FFFFFF">
+              <a:shade val="85000"/>
+            </a:srgbClr>
+          </a:solidFill>
+          <a:ln w="76200" cap="sq">
+            <a:solidFill>
+              <a:srgbClr val="FFFFFF"/>
+            </a:solidFill>
+            <a:miter lim="800000"/>
+          </a:ln>
+          <a:effectLst>
+            <a:outerShdw blurRad="55000" dist="18000" dir="5400000" algn="tl" rotWithShape="0">
+              <a:srgbClr val="000000">
+                <a:alpha val="40000"/>
+              </a:srgbClr>
+            </a:outerShdw>
+          </a:effectLst>
+          <a:scene3d>
+            <a:camera prst="orthographicFront"/>
+            <a:lightRig rig="twoPt" dir="t">
+              <a:rot lat="0" lon="0" rev="7200000"/>
+            </a:lightRig>
+          </a:scene3d>
+          <a:sp3d>
+            <a:bevelT w="25400" h="19050"/>
+            <a:contourClr>
+              <a:srgbClr val="FFFFFF"/>
+            </a:contourClr>
+          </a:sp3d>
+        </p:spPr>
+      </p:pic>
+      <p:pic>
+        <p:nvPicPr>
+          <p:cNvPr id="12" name="Picture 11"/>
+          <p:cNvPicPr>
+            <a:picLocks noChangeAspect="1"/>
+          </p:cNvPicPr>
+          <p:nvPr/>
+        </p:nvPicPr>
+        <p:blipFill rotWithShape="1">
+          <a:blip r:embed="rId4">
+            <a:extLst>
+              <a:ext uri="{28A0092B-C50C-407E-A947-70E740481C1C}">
+                <a14:useLocalDpi xmlns:a14="http://schemas.microsoft.com/office/drawing/2010/main" val="0"/>
+              </a:ext>
+            </a:extLst>
+          </a:blip>
+          <a:srcRect l="30807" t="9336" r="32343" b="4292"/>
+          <a:stretch/>
+        </p:blipFill>
+        <p:spPr>
+          <a:xfrm>
+            <a:off x="6257977" y="607946"/>
+            <a:ext cx="3013965" cy="5847281"/>
+          </a:xfrm>
+          <a:prstGeom prst="rect">
+            <a:avLst/>
+          </a:prstGeom>
+          <a:solidFill>
+            <a:srgbClr val="FFFFFF">
+              <a:shade val="85000"/>
+            </a:srgbClr>
+          </a:solidFill>
+          <a:ln w="76200" cap="sq">
+            <a:solidFill>
+              <a:srgbClr val="FFFFFF"/>
+            </a:solidFill>
+            <a:miter lim="800000"/>
+          </a:ln>
+          <a:effectLst>
+            <a:outerShdw blurRad="55000" dist="18000" dir="5400000" algn="tl" rotWithShape="0">
+              <a:srgbClr val="000000">
+                <a:alpha val="40000"/>
+              </a:srgbClr>
+            </a:outerShdw>
+          </a:effectLst>
+          <a:scene3d>
+            <a:camera prst="orthographicFront"/>
+            <a:lightRig rig="twoPt" dir="t">
+              <a:rot lat="0" lon="0" rev="7200000"/>
+            </a:lightRig>
+          </a:scene3d>
+          <a:sp3d>
+            <a:bevelT w="25400" h="19050"/>
+            <a:contourClr>
+              <a:srgbClr val="FFFFFF"/>
+            </a:contourClr>
+          </a:sp3d>
+        </p:spPr>
+      </p:pic>
+      <p:pic>
+        <p:nvPicPr>
+          <p:cNvPr id="8" name="Picture 7"/>
+          <p:cNvPicPr>
+            <a:picLocks noChangeAspect="1"/>
+          </p:cNvPicPr>
+          <p:nvPr/>
+        </p:nvPicPr>
+        <p:blipFill rotWithShape="1">
+          <a:blip r:embed="rId5">
+            <a:extLst>
+              <a:ext uri="{28A0092B-C50C-407E-A947-70E740481C1C}">
+                <a14:useLocalDpi xmlns:a14="http://schemas.microsoft.com/office/drawing/2010/main" val="0"/>
+              </a:ext>
+            </a:extLst>
+          </a:blip>
+          <a:srcRect l="29482" t="244" r="29262" b="2592"/>
+          <a:stretch/>
+        </p:blipFill>
+        <p:spPr>
+          <a:xfrm>
+            <a:off x="6259286" y="587553"/>
+            <a:ext cx="3004457" cy="5856789"/>
+          </a:xfrm>
+          <a:prstGeom prst="rect">
+            <a:avLst/>
+          </a:prstGeom>
+          <a:solidFill>
+            <a:srgbClr val="FFFFFF">
+              <a:shade val="85000"/>
+            </a:srgbClr>
+          </a:solidFill>
+          <a:ln w="76200" cap="sq">
+            <a:solidFill>
+              <a:srgbClr val="FFFFFF"/>
+            </a:solidFill>
+            <a:miter lim="800000"/>
+          </a:ln>
+          <a:effectLst>
+            <a:outerShdw blurRad="55000" dist="18000" dir="5400000" algn="tl" rotWithShape="0">
+              <a:srgbClr val="000000">
+                <a:alpha val="40000"/>
+              </a:srgbClr>
+            </a:outerShdw>
+          </a:effectLst>
+          <a:scene3d>
+            <a:camera prst="orthographicFront"/>
+            <a:lightRig rig="twoPt" dir="t">
+              <a:rot lat="0" lon="0" rev="7200000"/>
+            </a:lightRig>
+          </a:scene3d>
+          <a:sp3d>
+            <a:bevelT w="25400" h="19050"/>
+            <a:contourClr>
+              <a:srgbClr val="FFFFFF"/>
+            </a:contourClr>
+          </a:sp3d>
+        </p:spPr>
+      </p:pic>
     </p:spTree>
     <p:extLst>
       <p:ext uri="{BB962C8B-B14F-4D97-AF65-F5344CB8AC3E}">
-        <p14:creationId xmlns:p14="http://schemas.microsoft.com/office/powerpoint/2010/main" val="28893490"/>
+        <p14:creationId xmlns:p14="http://schemas.microsoft.com/office/powerpoint/2010/main" val="4208328879"/>
       </p:ext>
     </p:extLst>
   </p:cSld>
   <p:clrMapOvr>
     <a:masterClrMapping/>
   </p:clrMapOvr>
+  <p:timing>
+    <p:tnLst>
+      <p:par>
+        <p:cTn id="1" dur="indefinite" restart="never" nodeType="tmRoot">
+          <p:childTnLst>
+            <p:seq concurrent="1" nextAc="seek">
+              <p:cTn id="2" dur="indefinite" nodeType="mainSeq">
+                <p:childTnLst>
+                  <p:par>
+                    <p:cTn id="3" fill="hold">
+                      <p:stCondLst>
+                        <p:cond delay="indefinite"/>
+                      </p:stCondLst>
+                      <p:childTnLst>
+                        <p:par>
+                          <p:cTn id="4" fill="hold">
+                            <p:stCondLst>
+                              <p:cond delay="0"/>
+                            </p:stCondLst>
+                            <p:childTnLst>
+                              <p:par>
+                                <p:cTn id="5" presetID="10" presetClass="entr" presetSubtype="0" fill="hold" nodeType="clickEffect">
+                                  <p:stCondLst>
+                                    <p:cond delay="0"/>
+                                  </p:stCondLst>
+                                  <p:childTnLst>
+                                    <p:set>
+                                      <p:cBhvr>
+                                        <p:cTn id="6" dur="1" fill="hold">
+                                          <p:stCondLst>
+                                            <p:cond delay="0"/>
+                                          </p:stCondLst>
+                                        </p:cTn>
+                                        <p:tgtEl>
+                                          <p:spTgt spid="3">
+                                            <p:txEl>
+                                              <p:pRg st="1" end="1"/>
+                                            </p:txEl>
+                                          </p:spTgt>
+                                        </p:tgtEl>
+                                        <p:attrNameLst>
+                                          <p:attrName>style.visibility</p:attrName>
+                                        </p:attrNameLst>
+                                      </p:cBhvr>
+                                      <p:to>
+                                        <p:strVal val="visible"/>
+                                      </p:to>
+                                    </p:set>
+                                    <p:animEffect transition="in" filter="fade">
+                                      <p:cBhvr>
+                                        <p:cTn id="7" dur="1000"/>
+                                        <p:tgtEl>
+                                          <p:spTgt spid="3">
+                                            <p:txEl>
+                                              <p:pRg st="1" end="1"/>
+                                            </p:txEl>
+                                          </p:spTgt>
+                                        </p:tgtEl>
+                                      </p:cBhvr>
+                                    </p:animEffect>
+                                  </p:childTnLst>
+                                </p:cTn>
+                              </p:par>
+                              <p:par>
+                                <p:cTn id="8" presetID="10" presetClass="exit" presetSubtype="0" fill="hold" nodeType="withEffect">
+                                  <p:stCondLst>
+                                    <p:cond delay="0"/>
+                                  </p:stCondLst>
+                                  <p:childTnLst>
+                                    <p:animEffect transition="out" filter="fade">
+                                      <p:cBhvr>
+                                        <p:cTn id="9" dur="1000"/>
+                                        <p:tgtEl>
+                                          <p:spTgt spid="8"/>
+                                        </p:tgtEl>
+                                      </p:cBhvr>
+                                    </p:animEffect>
+                                    <p:set>
+                                      <p:cBhvr>
+                                        <p:cTn id="10" dur="1" fill="hold">
+                                          <p:stCondLst>
+                                            <p:cond delay="999"/>
+                                          </p:stCondLst>
+                                        </p:cTn>
+                                        <p:tgtEl>
+                                          <p:spTgt spid="8"/>
+                                        </p:tgtEl>
+                                        <p:attrNameLst>
+                                          <p:attrName>style.visibility</p:attrName>
+                                        </p:attrNameLst>
+                                      </p:cBhvr>
+                                      <p:to>
+                                        <p:strVal val="hidden"/>
+                                      </p:to>
+                                    </p:set>
+                                  </p:childTnLst>
+                                </p:cTn>
+                              </p:par>
+                            </p:childTnLst>
+                          </p:cTn>
+                        </p:par>
+                      </p:childTnLst>
+                    </p:cTn>
+                  </p:par>
+                  <p:par>
+                    <p:cTn id="11" fill="hold">
+                      <p:stCondLst>
+                        <p:cond delay="indefinite"/>
+                      </p:stCondLst>
+                      <p:childTnLst>
+                        <p:par>
+                          <p:cTn id="12" fill="hold">
+                            <p:stCondLst>
+                              <p:cond delay="0"/>
+                            </p:stCondLst>
+                            <p:childTnLst>
+                              <p:par>
+                                <p:cTn id="13" presetID="10" presetClass="entr" presetSubtype="0" fill="hold" nodeType="clickEffect">
+                                  <p:stCondLst>
+                                    <p:cond delay="0"/>
+                                  </p:stCondLst>
+                                  <p:childTnLst>
+                                    <p:set>
+                                      <p:cBhvr>
+                                        <p:cTn id="14" dur="1" fill="hold">
+                                          <p:stCondLst>
+                                            <p:cond delay="0"/>
+                                          </p:stCondLst>
+                                        </p:cTn>
+                                        <p:tgtEl>
+                                          <p:spTgt spid="3">
+                                            <p:txEl>
+                                              <p:pRg st="2" end="2"/>
+                                            </p:txEl>
+                                          </p:spTgt>
+                                        </p:tgtEl>
+                                        <p:attrNameLst>
+                                          <p:attrName>style.visibility</p:attrName>
+                                        </p:attrNameLst>
+                                      </p:cBhvr>
+                                      <p:to>
+                                        <p:strVal val="visible"/>
+                                      </p:to>
+                                    </p:set>
+                                    <p:animEffect transition="in" filter="fade">
+                                      <p:cBhvr>
+                                        <p:cTn id="15" dur="1000"/>
+                                        <p:tgtEl>
+                                          <p:spTgt spid="3">
+                                            <p:txEl>
+                                              <p:pRg st="2" end="2"/>
+                                            </p:txEl>
+                                          </p:spTgt>
+                                        </p:tgtEl>
+                                      </p:cBhvr>
+                                    </p:animEffect>
+                                  </p:childTnLst>
+                                </p:cTn>
+                              </p:par>
+                              <p:par>
+                                <p:cTn id="16" presetID="10" presetClass="exit" presetSubtype="0" fill="hold" nodeType="withEffect">
+                                  <p:stCondLst>
+                                    <p:cond delay="0"/>
+                                  </p:stCondLst>
+                                  <p:childTnLst>
+                                    <p:animEffect transition="out" filter="fade">
+                                      <p:cBhvr>
+                                        <p:cTn id="17" dur="1000"/>
+                                        <p:tgtEl>
+                                          <p:spTgt spid="12"/>
+                                        </p:tgtEl>
+                                      </p:cBhvr>
+                                    </p:animEffect>
+                                    <p:set>
+                                      <p:cBhvr>
+                                        <p:cTn id="18" dur="1" fill="hold">
+                                          <p:stCondLst>
+                                            <p:cond delay="999"/>
+                                          </p:stCondLst>
+                                        </p:cTn>
+                                        <p:tgtEl>
+                                          <p:spTgt spid="12"/>
+                                        </p:tgtEl>
+                                        <p:attrNameLst>
+                                          <p:attrName>style.visibility</p:attrName>
+                                        </p:attrNameLst>
+                                      </p:cBhvr>
+                                      <p:to>
+                                        <p:strVal val="hidden"/>
+                                      </p:to>
+                                    </p:set>
+                                  </p:childTnLst>
+                                </p:cTn>
+                              </p:par>
+                            </p:childTnLst>
+                          </p:cTn>
+                        </p:par>
+                      </p:childTnLst>
+                    </p:cTn>
+                  </p:par>
+                  <p:par>
+                    <p:cTn id="19" fill="hold">
+                      <p:stCondLst>
+                        <p:cond delay="indefinite"/>
+                      </p:stCondLst>
+                      <p:childTnLst>
+                        <p:par>
+                          <p:cTn id="20" fill="hold">
+                            <p:stCondLst>
+                              <p:cond delay="0"/>
+                            </p:stCondLst>
+                            <p:childTnLst>
+                              <p:par>
+                                <p:cTn id="21" presetID="10" presetClass="entr" presetSubtype="0" fill="hold" nodeType="clickEffect">
+                                  <p:stCondLst>
+                                    <p:cond delay="0"/>
+                                  </p:stCondLst>
+                                  <p:childTnLst>
+                                    <p:set>
+                                      <p:cBhvr>
+                                        <p:cTn id="22" dur="1" fill="hold">
+                                          <p:stCondLst>
+                                            <p:cond delay="0"/>
+                                          </p:stCondLst>
+                                        </p:cTn>
+                                        <p:tgtEl>
+                                          <p:spTgt spid="3">
+                                            <p:txEl>
+                                              <p:pRg st="3" end="3"/>
+                                            </p:txEl>
+                                          </p:spTgt>
+                                        </p:tgtEl>
+                                        <p:attrNameLst>
+                                          <p:attrName>style.visibility</p:attrName>
+                                        </p:attrNameLst>
+                                      </p:cBhvr>
+                                      <p:to>
+                                        <p:strVal val="visible"/>
+                                      </p:to>
+                                    </p:set>
+                                    <p:animEffect transition="in" filter="fade">
+                                      <p:cBhvr>
+                                        <p:cTn id="23" dur="1000"/>
+                                        <p:tgtEl>
+                                          <p:spTgt spid="3">
+                                            <p:txEl>
+                                              <p:pRg st="3" end="3"/>
+                                            </p:txEl>
+                                          </p:spTgt>
+                                        </p:tgtEl>
+                                      </p:cBhvr>
+                                    </p:animEffect>
+                                  </p:childTnLst>
+                                </p:cTn>
+                              </p:par>
+                              <p:par>
+                                <p:cTn id="24" presetID="10" presetClass="exit" presetSubtype="0" fill="hold" nodeType="withEffect">
+                                  <p:stCondLst>
+                                    <p:cond delay="0"/>
+                                  </p:stCondLst>
+                                  <p:childTnLst>
+                                    <p:animEffect transition="out" filter="fade">
+                                      <p:cBhvr>
+                                        <p:cTn id="25" dur="1000"/>
+                                        <p:tgtEl>
+                                          <p:spTgt spid="13"/>
+                                        </p:tgtEl>
+                                      </p:cBhvr>
+                                    </p:animEffect>
+                                    <p:set>
+                                      <p:cBhvr>
+                                        <p:cTn id="26" dur="1" fill="hold">
+                                          <p:stCondLst>
+                                            <p:cond delay="999"/>
+                                          </p:stCondLst>
+                                        </p:cTn>
+                                        <p:tgtEl>
+                                          <p:spTgt spid="13"/>
+                                        </p:tgtEl>
+                                        <p:attrNameLst>
+                                          <p:attrName>style.visibility</p:attrName>
+                                        </p:attrNameLst>
+                                      </p:cBhvr>
+                                      <p:to>
+                                        <p:strVal val="hidden"/>
+                                      </p:to>
+                                    </p:set>
+                                  </p:childTnLst>
+                                </p:cTn>
+                              </p:par>
+                            </p:childTnLst>
+                          </p:cTn>
+                        </p:par>
+                      </p:childTnLst>
+                    </p:cTn>
+                  </p:par>
+                </p:childTnLst>
+              </p:cTn>
+              <p:prevCondLst>
+                <p:cond evt="onPrev" delay="0">
+                  <p:tgtEl>
+                    <p:sldTgt/>
+                  </p:tgtEl>
+                </p:cond>
+              </p:prevCondLst>
+              <p:nextCondLst>
+                <p:cond evt="onNext" delay="0">
+                  <p:tgtEl>
+                    <p:sldTgt/>
+                  </p:tgtEl>
+                </p:cond>
+              </p:nextCondLst>
+            </p:seq>
+          </p:childTnLst>
+        </p:cTn>
+      </p:par>
+    </p:tnLst>
+  </p:timing>
 </p:sld>
 </file>
 
@@ -8383,53 +11074,65 @@
         </p:nvSpPr>
         <p:spPr/>
         <p:txBody>
-          <a:bodyPr/>
+          <a:bodyPr>
+            <a:normAutofit/>
+          </a:bodyPr>
           <a:lstStyle/>
           <a:p>
             <a:r>
-              <a:rPr lang="en-CA" dirty="0" smtClean="0"/>
-              <a:t>Results</a:t>
-            </a:r>
-            <a:endParaRPr lang="en-CA" dirty="0"/>
-          </a:p>
-        </p:txBody>
-      </p:sp>
-      <p:sp>
-        <p:nvSpPr>
-          <p:cNvPr id="3" name="Content Placeholder 2"/>
-          <p:cNvSpPr>
-            <a:spLocks noGrp="1"/>
-          </p:cNvSpPr>
+              <a:rPr lang="en-CA" sz="4800" dirty="0" smtClean="0"/>
+              <a:t>Methods – Pre-processing</a:t>
+            </a:r>
+            <a:endParaRPr lang="en-CA" sz="4800" dirty="0"/>
+          </a:p>
+        </p:txBody>
+      </p:sp>
+      <p:pic>
+        <p:nvPicPr>
+          <p:cNvPr id="5" name="Content Placeholder 4"/>
+          <p:cNvPicPr>
+            <a:picLocks noGrp="1" noChangeAspect="1"/>
+          </p:cNvPicPr>
           <p:nvPr>
             <p:ph idx="1"/>
           </p:nvPr>
-        </p:nvSpPr>
-        <p:spPr/>
-        <p:txBody>
-          <a:bodyPr/>
-          <a:lstStyle/>
-          <a:p>
-            <a:endParaRPr lang="en-CA" dirty="0">
-              <a:solidFill>
-                <a:schemeClr val="bg1">
-                  <a:lumMod val="95000"/>
-                  <a:lumOff val="5000"/>
-                </a:schemeClr>
-              </a:solidFill>
-            </a:endParaRPr>
-          </a:p>
-        </p:txBody>
-      </p:sp>
+        </p:nvPicPr>
+        <p:blipFill>
+          <a:blip r:embed="rId2" cstate="print">
+            <a:extLst>
+              <a:ext uri="{28A0092B-C50C-407E-A947-70E740481C1C}">
+                <a14:useLocalDpi xmlns:a14="http://schemas.microsoft.com/office/drawing/2010/main" val="0"/>
+              </a:ext>
+            </a:extLst>
+          </a:blip>
+          <a:stretch>
+            <a:fillRect/>
+          </a:stretch>
+        </p:blipFill>
+        <p:spPr>
+          <a:xfrm>
+            <a:off x="1856694" y="2084680"/>
+            <a:ext cx="8478613" cy="4414091"/>
+          </a:xfrm>
+        </p:spPr>
+      </p:pic>
     </p:spTree>
     <p:extLst>
       <p:ext uri="{BB962C8B-B14F-4D97-AF65-F5344CB8AC3E}">
-        <p14:creationId xmlns:p14="http://schemas.microsoft.com/office/powerpoint/2010/main" val="1617845456"/>
+        <p14:creationId xmlns:p14="http://schemas.microsoft.com/office/powerpoint/2010/main" val="4115807974"/>
       </p:ext>
     </p:extLst>
   </p:cSld>
   <p:clrMapOvr>
     <a:masterClrMapping/>
   </p:clrMapOvr>
+  <p:timing>
+    <p:tnLst>
+      <p:par>
+        <p:cTn id="1" dur="indefinite" restart="never" nodeType="tmRoot"/>
+      </p:par>
+    </p:tnLst>
+  </p:timing>
 </p:sld>
 </file>
 
@@ -8450,65 +11153,549 @@
           <a:chExt cx="0" cy="0"/>
         </a:xfrm>
       </p:grpSpPr>
-      <p:sp>
-        <p:nvSpPr>
-          <p:cNvPr id="2" name="Title 1"/>
-          <p:cNvSpPr>
-            <a:spLocks noGrp="1"/>
-          </p:cNvSpPr>
-          <p:nvPr>
-            <p:ph type="title"/>
-          </p:nvPr>
-        </p:nvSpPr>
-        <p:spPr/>
-        <p:txBody>
-          <a:bodyPr/>
-          <a:lstStyle/>
-          <a:p>
-            <a:r>
-              <a:rPr lang="en-CA" dirty="0" smtClean="0"/>
-              <a:t>Discussion</a:t>
-            </a:r>
-            <a:endParaRPr lang="en-CA" dirty="0"/>
-          </a:p>
-        </p:txBody>
-      </p:sp>
-      <p:sp>
-        <p:nvSpPr>
-          <p:cNvPr id="3" name="Content Placeholder 2"/>
-          <p:cNvSpPr>
-            <a:spLocks noGrp="1"/>
-          </p:cNvSpPr>
-          <p:nvPr>
-            <p:ph idx="1"/>
-          </p:nvPr>
-        </p:nvSpPr>
-        <p:spPr/>
-        <p:txBody>
-          <a:bodyPr/>
-          <a:lstStyle/>
-          <a:p>
-            <a:endParaRPr lang="en-CA" dirty="0">
-              <a:solidFill>
-                <a:schemeClr val="bg1">
-                  <a:lumMod val="95000"/>
-                  <a:lumOff val="5000"/>
-                </a:schemeClr>
-              </a:solidFill>
-            </a:endParaRPr>
-          </a:p>
-        </p:txBody>
-      </p:sp>
+      <p:pic>
+        <p:nvPicPr>
+          <p:cNvPr id="2" name="Picture 1"/>
+          <p:cNvPicPr>
+            <a:picLocks noChangeAspect="1"/>
+          </p:cNvPicPr>
+          <p:nvPr/>
+        </p:nvPicPr>
+        <p:blipFill rotWithShape="1">
+          <a:blip r:embed="rId2">
+            <a:extLst>
+              <a:ext uri="{28A0092B-C50C-407E-A947-70E740481C1C}">
+                <a14:useLocalDpi xmlns:a14="http://schemas.microsoft.com/office/drawing/2010/main" val="0"/>
+              </a:ext>
+            </a:extLst>
+          </a:blip>
+          <a:srcRect l="32002" t="2382" r="32450" b="4970"/>
+          <a:stretch/>
+        </p:blipFill>
+        <p:spPr>
+          <a:xfrm>
+            <a:off x="4366020" y="713777"/>
+            <a:ext cx="2589951" cy="5477192"/>
+          </a:xfrm>
+          <a:prstGeom prst="rect">
+            <a:avLst/>
+          </a:prstGeom>
+          <a:solidFill>
+            <a:srgbClr val="FFFFFF">
+              <a:shade val="85000"/>
+            </a:srgbClr>
+          </a:solidFill>
+          <a:ln w="76200" cap="sq">
+            <a:solidFill>
+              <a:srgbClr val="FFFFFF"/>
+            </a:solidFill>
+            <a:miter lim="800000"/>
+          </a:ln>
+          <a:effectLst>
+            <a:outerShdw blurRad="55000" dist="18000" dir="5400000" algn="tl" rotWithShape="0">
+              <a:srgbClr val="000000">
+                <a:alpha val="40000"/>
+              </a:srgbClr>
+            </a:outerShdw>
+          </a:effectLst>
+          <a:scene3d>
+            <a:camera prst="orthographicFront"/>
+            <a:lightRig rig="twoPt" dir="t">
+              <a:rot lat="0" lon="0" rev="7200000"/>
+            </a:lightRig>
+          </a:scene3d>
+          <a:sp3d>
+            <a:bevelT w="25400" h="19050"/>
+            <a:contourClr>
+              <a:srgbClr val="FFFFFF"/>
+            </a:contourClr>
+          </a:sp3d>
+        </p:spPr>
+      </p:pic>
+      <p:pic>
+        <p:nvPicPr>
+          <p:cNvPr id="3" name="Picture 2"/>
+          <p:cNvPicPr>
+            <a:picLocks noChangeAspect="1"/>
+          </p:cNvPicPr>
+          <p:nvPr/>
+        </p:nvPicPr>
+        <p:blipFill rotWithShape="1">
+          <a:blip r:embed="rId3">
+            <a:extLst>
+              <a:ext uri="{28A0092B-C50C-407E-A947-70E740481C1C}">
+                <a14:useLocalDpi xmlns:a14="http://schemas.microsoft.com/office/drawing/2010/main" val="0"/>
+              </a:ext>
+            </a:extLst>
+          </a:blip>
+          <a:srcRect l="32344" t="2172" r="32365" b="5129"/>
+          <a:stretch/>
+        </p:blipFill>
+        <p:spPr>
+          <a:xfrm>
+            <a:off x="7631736" y="710782"/>
+            <a:ext cx="2571184" cy="5480187"/>
+          </a:xfrm>
+          <a:prstGeom prst="rect">
+            <a:avLst/>
+          </a:prstGeom>
+          <a:solidFill>
+            <a:srgbClr val="FFFFFF">
+              <a:shade val="85000"/>
+            </a:srgbClr>
+          </a:solidFill>
+          <a:ln w="76200" cap="sq">
+            <a:solidFill>
+              <a:srgbClr val="FFFFFF"/>
+            </a:solidFill>
+            <a:miter lim="800000"/>
+          </a:ln>
+          <a:effectLst>
+            <a:outerShdw blurRad="55000" dist="18000" dir="5400000" algn="tl" rotWithShape="0">
+              <a:srgbClr val="000000">
+                <a:alpha val="40000"/>
+              </a:srgbClr>
+            </a:outerShdw>
+          </a:effectLst>
+          <a:scene3d>
+            <a:camera prst="orthographicFront"/>
+            <a:lightRig rig="twoPt" dir="t">
+              <a:rot lat="0" lon="0" rev="7200000"/>
+            </a:lightRig>
+          </a:scene3d>
+          <a:sp3d>
+            <a:bevelT w="25400" h="19050"/>
+            <a:contourClr>
+              <a:srgbClr val="FFFFFF"/>
+            </a:contourClr>
+          </a:sp3d>
+        </p:spPr>
+      </p:pic>
+      <p:pic>
+        <p:nvPicPr>
+          <p:cNvPr id="4" name="Picture 3"/>
+          <p:cNvPicPr>
+            <a:picLocks noChangeAspect="1"/>
+          </p:cNvPicPr>
+          <p:nvPr/>
+        </p:nvPicPr>
+        <p:blipFill rotWithShape="1">
+          <a:blip r:embed="rId4">
+            <a:extLst>
+              <a:ext uri="{28A0092B-C50C-407E-A947-70E740481C1C}">
+                <a14:useLocalDpi xmlns:a14="http://schemas.microsoft.com/office/drawing/2010/main" val="0"/>
+              </a:ext>
+            </a:extLst>
+          </a:blip>
+          <a:srcRect l="31578" t="2784" r="32801" b="4647"/>
+          <a:stretch/>
+        </p:blipFill>
+        <p:spPr>
+          <a:xfrm>
+            <a:off x="1179512" y="729551"/>
+            <a:ext cx="2589951" cy="5461418"/>
+          </a:xfrm>
+          <a:prstGeom prst="rect">
+            <a:avLst/>
+          </a:prstGeom>
+          <a:solidFill>
+            <a:srgbClr val="FFFFFF">
+              <a:shade val="85000"/>
+            </a:srgbClr>
+          </a:solidFill>
+          <a:ln w="76200" cap="sq">
+            <a:solidFill>
+              <a:srgbClr val="FFFFFF"/>
+            </a:solidFill>
+            <a:miter lim="800000"/>
+          </a:ln>
+          <a:effectLst>
+            <a:outerShdw blurRad="55000" dist="18000" dir="5400000" algn="tl" rotWithShape="0">
+              <a:srgbClr val="000000">
+                <a:alpha val="40000"/>
+              </a:srgbClr>
+            </a:outerShdw>
+          </a:effectLst>
+          <a:scene3d>
+            <a:camera prst="orthographicFront"/>
+            <a:lightRig rig="twoPt" dir="t">
+              <a:rot lat="0" lon="0" rev="7200000"/>
+            </a:lightRig>
+          </a:scene3d>
+          <a:sp3d>
+            <a:bevelT w="25400" h="19050"/>
+            <a:contourClr>
+              <a:srgbClr val="FFFFFF"/>
+            </a:contourClr>
+          </a:sp3d>
+        </p:spPr>
+      </p:pic>
     </p:spTree>
     <p:extLst>
       <p:ext uri="{BB962C8B-B14F-4D97-AF65-F5344CB8AC3E}">
-        <p14:creationId xmlns:p14="http://schemas.microsoft.com/office/powerpoint/2010/main" val="3360305982"/>
+        <p14:creationId xmlns:p14="http://schemas.microsoft.com/office/powerpoint/2010/main" val="381065241"/>
       </p:ext>
     </p:extLst>
   </p:cSld>
   <p:clrMapOvr>
     <a:masterClrMapping/>
   </p:clrMapOvr>
+  <p:timing>
+    <p:tnLst>
+      <p:par>
+        <p:cTn id="1" dur="indefinite" restart="never" nodeType="tmRoot">
+          <p:childTnLst>
+            <p:seq concurrent="1" nextAc="seek">
+              <p:cTn id="2" dur="indefinite" nodeType="mainSeq">
+                <p:childTnLst>
+                  <p:par>
+                    <p:cTn id="3" fill="hold">
+                      <p:stCondLst>
+                        <p:cond delay="indefinite"/>
+                      </p:stCondLst>
+                      <p:childTnLst>
+                        <p:par>
+                          <p:cTn id="4" fill="hold">
+                            <p:stCondLst>
+                              <p:cond delay="0"/>
+                            </p:stCondLst>
+                            <p:childTnLst>
+                              <p:par>
+                                <p:cTn id="5" presetID="10" presetClass="entr" presetSubtype="0" fill="hold" nodeType="clickEffect">
+                                  <p:stCondLst>
+                                    <p:cond delay="500"/>
+                                  </p:stCondLst>
+                                  <p:childTnLst>
+                                    <p:set>
+                                      <p:cBhvr>
+                                        <p:cTn id="6" dur="1" fill="hold">
+                                          <p:stCondLst>
+                                            <p:cond delay="0"/>
+                                          </p:stCondLst>
+                                        </p:cTn>
+                                        <p:tgtEl>
+                                          <p:spTgt spid="2"/>
+                                        </p:tgtEl>
+                                        <p:attrNameLst>
+                                          <p:attrName>style.visibility</p:attrName>
+                                        </p:attrNameLst>
+                                      </p:cBhvr>
+                                      <p:to>
+                                        <p:strVal val="visible"/>
+                                      </p:to>
+                                    </p:set>
+                                    <p:animEffect transition="in" filter="fade">
+                                      <p:cBhvr>
+                                        <p:cTn id="7" dur="1000"/>
+                                        <p:tgtEl>
+                                          <p:spTgt spid="2"/>
+                                        </p:tgtEl>
+                                      </p:cBhvr>
+                                    </p:animEffect>
+                                  </p:childTnLst>
+                                </p:cTn>
+                              </p:par>
+                              <p:par>
+                                <p:cTn id="8" presetID="10" presetClass="exit" presetSubtype="0" fill="hold" nodeType="withEffect">
+                                  <p:stCondLst>
+                                    <p:cond delay="0"/>
+                                  </p:stCondLst>
+                                  <p:childTnLst>
+                                    <p:animEffect transition="out" filter="fade">
+                                      <p:cBhvr>
+                                        <p:cTn id="9" dur="1500"/>
+                                        <p:tgtEl>
+                                          <p:spTgt spid="3"/>
+                                        </p:tgtEl>
+                                      </p:cBhvr>
+                                    </p:animEffect>
+                                    <p:set>
+                                      <p:cBhvr>
+                                        <p:cTn id="10" dur="1" fill="hold">
+                                          <p:stCondLst>
+                                            <p:cond delay="1499"/>
+                                          </p:stCondLst>
+                                        </p:cTn>
+                                        <p:tgtEl>
+                                          <p:spTgt spid="3"/>
+                                        </p:tgtEl>
+                                        <p:attrNameLst>
+                                          <p:attrName>style.visibility</p:attrName>
+                                        </p:attrNameLst>
+                                      </p:cBhvr>
+                                      <p:to>
+                                        <p:strVal val="hidden"/>
+                                      </p:to>
+                                    </p:set>
+                                  </p:childTnLst>
+                                </p:cTn>
+                              </p:par>
+                              <p:par>
+                                <p:cTn id="11" presetID="10" presetClass="exit" presetSubtype="0" fill="hold" nodeType="withEffect">
+                                  <p:stCondLst>
+                                    <p:cond delay="0"/>
+                                  </p:stCondLst>
+                                  <p:childTnLst>
+                                    <p:animEffect transition="out" filter="fade">
+                                      <p:cBhvr>
+                                        <p:cTn id="12" dur="1500"/>
+                                        <p:tgtEl>
+                                          <p:spTgt spid="4"/>
+                                        </p:tgtEl>
+                                      </p:cBhvr>
+                                    </p:animEffect>
+                                    <p:set>
+                                      <p:cBhvr>
+                                        <p:cTn id="13" dur="1" fill="hold">
+                                          <p:stCondLst>
+                                            <p:cond delay="1499"/>
+                                          </p:stCondLst>
+                                        </p:cTn>
+                                        <p:tgtEl>
+                                          <p:spTgt spid="4"/>
+                                        </p:tgtEl>
+                                        <p:attrNameLst>
+                                          <p:attrName>style.visibility</p:attrName>
+                                        </p:attrNameLst>
+                                      </p:cBhvr>
+                                      <p:to>
+                                        <p:strVal val="hidden"/>
+                                      </p:to>
+                                    </p:set>
+                                  </p:childTnLst>
+                                </p:cTn>
+                              </p:par>
+                              <p:par>
+                                <p:cTn id="14" presetID="42" presetClass="path" presetSubtype="0" accel="50000" decel="50000" fill="hold" nodeType="withEffect">
+                                  <p:stCondLst>
+                                    <p:cond delay="0"/>
+                                  </p:stCondLst>
+                                  <p:childTnLst>
+                                    <p:animMotion origin="layout" path="M -4.58333E-6 3.7037E-7 L 0.25873 0.00023 " pathEditMode="relative" rAng="0" ptsTypes="AA">
+                                      <p:cBhvr>
+                                        <p:cTn id="15" dur="1000" fill="hold"/>
+                                        <p:tgtEl>
+                                          <p:spTgt spid="4"/>
+                                        </p:tgtEl>
+                                        <p:attrNameLst>
+                                          <p:attrName>ppt_x</p:attrName>
+                                          <p:attrName>ppt_y</p:attrName>
+                                        </p:attrNameLst>
+                                      </p:cBhvr>
+                                      <p:rCtr x="12930" y="0"/>
+                                    </p:animMotion>
+                                  </p:childTnLst>
+                                </p:cTn>
+                              </p:par>
+                              <p:par>
+                                <p:cTn id="16" presetID="42" presetClass="path" presetSubtype="0" accel="50000" decel="50000" fill="hold" nodeType="withEffect">
+                                  <p:stCondLst>
+                                    <p:cond delay="0"/>
+                                  </p:stCondLst>
+                                  <p:childTnLst>
+                                    <p:animMotion origin="layout" path="M -2.08333E-7 -7.40741E-7 L -0.26536 -7.40741E-7 " pathEditMode="relative" rAng="0" ptsTypes="AA">
+                                      <p:cBhvr>
+                                        <p:cTn id="17" dur="1000" fill="hold"/>
+                                        <p:tgtEl>
+                                          <p:spTgt spid="3"/>
+                                        </p:tgtEl>
+                                        <p:attrNameLst>
+                                          <p:attrName>ppt_x</p:attrName>
+                                          <p:attrName>ppt_y</p:attrName>
+                                        </p:attrNameLst>
+                                      </p:cBhvr>
+                                      <p:rCtr x="-13268" y="0"/>
+                                    </p:animMotion>
+                                  </p:childTnLst>
+                                </p:cTn>
+                              </p:par>
+                            </p:childTnLst>
+                          </p:cTn>
+                        </p:par>
+                      </p:childTnLst>
+                    </p:cTn>
+                  </p:par>
+                </p:childTnLst>
+              </p:cTn>
+              <p:prevCondLst>
+                <p:cond evt="onPrev" delay="0">
+                  <p:tgtEl>
+                    <p:sldTgt/>
+                  </p:tgtEl>
+                </p:cond>
+              </p:prevCondLst>
+              <p:nextCondLst>
+                <p:cond evt="onNext" delay="0">
+                  <p:tgtEl>
+                    <p:sldTgt/>
+                  </p:tgtEl>
+                </p:cond>
+              </p:nextCondLst>
+            </p:seq>
+          </p:childTnLst>
+        </p:cTn>
+      </p:par>
+    </p:tnLst>
+  </p:timing>
+</p:sld>
+</file>
+
+<file path=ppt/slides/slide9.xml><?xml version="1.0" encoding="utf-8"?>
+<p:sld xmlns:a="http://schemas.openxmlformats.org/drawingml/2006/main" xmlns:r="http://schemas.openxmlformats.org/officeDocument/2006/relationships" xmlns:p="http://schemas.openxmlformats.org/presentationml/2006/main">
+  <p:cSld>
+    <p:spTree>
+      <p:nvGrpSpPr>
+        <p:cNvPr id="1" name=""/>
+        <p:cNvGrpSpPr/>
+        <p:nvPr/>
+      </p:nvGrpSpPr>
+      <p:grpSpPr>
+        <a:xfrm>
+          <a:off x="0" y="0"/>
+          <a:ext cx="0" cy="0"/>
+          <a:chOff x="0" y="0"/>
+          <a:chExt cx="0" cy="0"/>
+        </a:xfrm>
+      </p:grpSpPr>
+      <p:pic>
+        <p:nvPicPr>
+          <p:cNvPr id="2" name="Picture 1"/>
+          <p:cNvPicPr>
+            <a:picLocks noChangeAspect="1"/>
+          </p:cNvPicPr>
+          <p:nvPr/>
+        </p:nvPicPr>
+        <p:blipFill rotWithShape="1">
+          <a:blip r:embed="rId2">
+            <a:extLst>
+              <a:ext uri="{28A0092B-C50C-407E-A947-70E740481C1C}">
+                <a14:useLocalDpi xmlns:a14="http://schemas.microsoft.com/office/drawing/2010/main" val="0"/>
+              </a:ext>
+            </a:extLst>
+          </a:blip>
+          <a:srcRect l="32002" t="2382" r="32450" b="4970"/>
+          <a:stretch/>
+        </p:blipFill>
+        <p:spPr>
+          <a:xfrm>
+            <a:off x="4366020" y="713777"/>
+            <a:ext cx="2589951" cy="5477192"/>
+          </a:xfrm>
+          <a:prstGeom prst="rect">
+            <a:avLst/>
+          </a:prstGeom>
+          <a:solidFill>
+            <a:srgbClr val="FFFFFF">
+              <a:shade val="85000"/>
+            </a:srgbClr>
+          </a:solidFill>
+          <a:ln w="76200" cap="sq">
+            <a:solidFill>
+              <a:srgbClr val="FFFFFF"/>
+            </a:solidFill>
+            <a:miter lim="800000"/>
+          </a:ln>
+          <a:effectLst>
+            <a:outerShdw blurRad="55000" dist="18000" dir="5400000" algn="tl" rotWithShape="0">
+              <a:srgbClr val="000000">
+                <a:alpha val="40000"/>
+              </a:srgbClr>
+            </a:outerShdw>
+          </a:effectLst>
+          <a:scene3d>
+            <a:camera prst="orthographicFront"/>
+            <a:lightRig rig="twoPt" dir="t">
+              <a:rot lat="0" lon="0" rev="7200000"/>
+            </a:lightRig>
+          </a:scene3d>
+          <a:sp3d>
+            <a:bevelT w="25400" h="19050"/>
+            <a:contourClr>
+              <a:srgbClr val="FFFFFF"/>
+            </a:contourClr>
+          </a:sp3d>
+        </p:spPr>
+      </p:pic>
+    </p:spTree>
+    <p:extLst>
+      <p:ext uri="{BB962C8B-B14F-4D97-AF65-F5344CB8AC3E}">
+        <p14:creationId xmlns:p14="http://schemas.microsoft.com/office/powerpoint/2010/main" val="2478668052"/>
+      </p:ext>
+    </p:extLst>
+  </p:cSld>
+  <p:clrMapOvr>
+    <a:masterClrMapping/>
+  </p:clrMapOvr>
+  <p:timing>
+    <p:tnLst>
+      <p:par>
+        <p:cTn id="1" dur="indefinite" restart="never" nodeType="tmRoot">
+          <p:childTnLst>
+            <p:seq concurrent="1" nextAc="seek">
+              <p:cTn id="2" dur="indefinite" nodeType="mainSeq">
+                <p:childTnLst>
+                  <p:par>
+                    <p:cTn id="3" fill="hold">
+                      <p:stCondLst>
+                        <p:cond delay="indefinite"/>
+                      </p:stCondLst>
+                      <p:childTnLst>
+                        <p:par>
+                          <p:cTn id="4" fill="hold">
+                            <p:stCondLst>
+                              <p:cond delay="0"/>
+                            </p:stCondLst>
+                            <p:childTnLst>
+                              <p:par>
+                                <p:cTn id="5" presetID="42" presetClass="path" presetSubtype="0" accel="50000" decel="50000" fill="hold" nodeType="clickEffect">
+                                  <p:stCondLst>
+                                    <p:cond delay="0"/>
+                                  </p:stCondLst>
+                                  <p:childTnLst>
+                                    <p:animMotion origin="layout" path="M -2.91667E-6 -2.22222E-6 L -0.29284 0.00139 " pathEditMode="relative" rAng="0" ptsTypes="AA">
+                                      <p:cBhvr>
+                                        <p:cTn id="6" dur="1500" fill="hold"/>
+                                        <p:tgtEl>
+                                          <p:spTgt spid="2"/>
+                                        </p:tgtEl>
+                                        <p:attrNameLst>
+                                          <p:attrName>ppt_x</p:attrName>
+                                          <p:attrName>ppt_y</p:attrName>
+                                        </p:attrNameLst>
+                                      </p:cBhvr>
+                                      <p:rCtr x="-14648" y="69"/>
+                                    </p:animMotion>
+                                  </p:childTnLst>
+                                </p:cTn>
+                              </p:par>
+                            </p:childTnLst>
+                          </p:cTn>
+                        </p:par>
+                      </p:childTnLst>
+                    </p:cTn>
+                  </p:par>
+                </p:childTnLst>
+              </p:cTn>
+              <p:prevCondLst>
+                <p:cond evt="onPrev" delay="0">
+                  <p:tgtEl>
+                    <p:sldTgt/>
+                  </p:tgtEl>
+                </p:cond>
+              </p:prevCondLst>
+              <p:nextCondLst>
+                <p:cond evt="onNext" delay="0">
+                  <p:tgtEl>
+                    <p:sldTgt/>
+                  </p:tgtEl>
+                </p:cond>
+              </p:nextCondLst>
+            </p:seq>
+          </p:childTnLst>
+        </p:cTn>
+      </p:par>
+    </p:tnLst>
+  </p:timing>
 </p:sld>
 </file>
 

</xml_diff>

<commit_message>
CISC 897 Final Survey - Report's got the length, just proofread and whatnot
</commit_message>
<xml_diff>
--- a/CISC874/Project/Presentation/0bc15Presentation.pptx
+++ b/CISC874/Project/Presentation/0bc15Presentation.pptx
@@ -397,7 +397,7 @@
           <a:p>
             <a:fld id="{8C1E5588-8BC4-4B22-ADAE-E90DB866E4BB}" type="datetimeFigureOut">
               <a:rPr lang="en-CA" smtClean="0"/>
-              <a:t>30/11/2016</a:t>
+              <a:t>01/12/2016</a:t>
             </a:fld>
             <a:endParaRPr lang="en-CA"/>
           </a:p>
@@ -811,7 +811,7 @@
           <a:p>
             <a:fld id="{8C1E5588-8BC4-4B22-ADAE-E90DB866E4BB}" type="datetimeFigureOut">
               <a:rPr lang="en-CA" smtClean="0"/>
-              <a:t>30/11/2016</a:t>
+              <a:t>01/12/2016</a:t>
             </a:fld>
             <a:endParaRPr lang="en-CA"/>
           </a:p>
@@ -1147,7 +1147,7 @@
           <a:p>
             <a:fld id="{8C1E5588-8BC4-4B22-ADAE-E90DB866E4BB}" type="datetimeFigureOut">
               <a:rPr lang="en-CA" smtClean="0"/>
-              <a:t>30/11/2016</a:t>
+              <a:t>01/12/2016</a:t>
             </a:fld>
             <a:endParaRPr lang="en-CA"/>
           </a:p>
@@ -1552,7 +1552,7 @@
           <a:p>
             <a:fld id="{8C1E5588-8BC4-4B22-ADAE-E90DB866E4BB}" type="datetimeFigureOut">
               <a:rPr lang="en-CA" smtClean="0"/>
-              <a:t>30/11/2016</a:t>
+              <a:t>01/12/2016</a:t>
             </a:fld>
             <a:endParaRPr lang="en-CA"/>
           </a:p>
@@ -2120,7 +2120,7 @@
           <a:p>
             <a:fld id="{8C1E5588-8BC4-4B22-ADAE-E90DB866E4BB}" type="datetimeFigureOut">
               <a:rPr lang="en-CA" smtClean="0"/>
-              <a:t>30/11/2016</a:t>
+              <a:t>01/12/2016</a:t>
             </a:fld>
             <a:endParaRPr lang="en-CA"/>
           </a:p>
@@ -2801,7 +2801,7 @@
           <a:p>
             <a:fld id="{8C1E5588-8BC4-4B22-ADAE-E90DB866E4BB}" type="datetimeFigureOut">
               <a:rPr lang="en-CA" smtClean="0"/>
-              <a:t>30/11/2016</a:t>
+              <a:t>01/12/2016</a:t>
             </a:fld>
             <a:endParaRPr lang="en-CA"/>
           </a:p>
@@ -3714,7 +3714,7 @@
           <a:p>
             <a:fld id="{8C1E5588-8BC4-4B22-ADAE-E90DB866E4BB}" type="datetimeFigureOut">
               <a:rPr lang="en-CA" smtClean="0"/>
-              <a:t>30/11/2016</a:t>
+              <a:t>01/12/2016</a:t>
             </a:fld>
             <a:endParaRPr lang="en-CA"/>
           </a:p>
@@ -4027,7 +4027,7 @@
           <a:p>
             <a:fld id="{8C1E5588-8BC4-4B22-ADAE-E90DB866E4BB}" type="datetimeFigureOut">
               <a:rPr lang="en-CA" smtClean="0"/>
-              <a:t>30/11/2016</a:t>
+              <a:t>01/12/2016</a:t>
             </a:fld>
             <a:endParaRPr lang="en-CA"/>
           </a:p>
@@ -4291,7 +4291,7 @@
           <a:p>
             <a:fld id="{8C1E5588-8BC4-4B22-ADAE-E90DB866E4BB}" type="datetimeFigureOut">
               <a:rPr lang="en-CA" smtClean="0"/>
-              <a:t>30/11/2016</a:t>
+              <a:t>01/12/2016</a:t>
             </a:fld>
             <a:endParaRPr lang="en-CA"/>
           </a:p>
@@ -4632,7 +4632,7 @@
           <a:p>
             <a:fld id="{8C1E5588-8BC4-4B22-ADAE-E90DB866E4BB}" type="datetimeFigureOut">
               <a:rPr lang="en-CA" smtClean="0"/>
-              <a:t>30/11/2016</a:t>
+              <a:t>01/12/2016</a:t>
             </a:fld>
             <a:endParaRPr lang="en-CA"/>
           </a:p>
@@ -5021,7 +5021,7 @@
           <a:p>
             <a:fld id="{8C1E5588-8BC4-4B22-ADAE-E90DB866E4BB}" type="datetimeFigureOut">
               <a:rPr lang="en-CA" smtClean="0"/>
-              <a:t>30/11/2016</a:t>
+              <a:t>01/12/2016</a:t>
             </a:fld>
             <a:endParaRPr lang="en-CA"/>
           </a:p>
@@ -5397,7 +5397,7 @@
           <a:p>
             <a:fld id="{8C1E5588-8BC4-4B22-ADAE-E90DB866E4BB}" type="datetimeFigureOut">
               <a:rPr lang="en-CA" smtClean="0"/>
-              <a:t>30/11/2016</a:t>
+              <a:t>01/12/2016</a:t>
             </a:fld>
             <a:endParaRPr lang="en-CA"/>
           </a:p>
@@ -5903,7 +5903,7 @@
           <a:p>
             <a:fld id="{8C1E5588-8BC4-4B22-ADAE-E90DB866E4BB}" type="datetimeFigureOut">
               <a:rPr lang="en-CA" smtClean="0"/>
-              <a:t>30/11/2016</a:t>
+              <a:t>01/12/2016</a:t>
             </a:fld>
             <a:endParaRPr lang="en-CA"/>
           </a:p>
@@ -6160,7 +6160,7 @@
           <a:p>
             <a:fld id="{8C1E5588-8BC4-4B22-ADAE-E90DB866E4BB}" type="datetimeFigureOut">
               <a:rPr lang="en-CA" smtClean="0"/>
-              <a:t>30/11/2016</a:t>
+              <a:t>01/12/2016</a:t>
             </a:fld>
             <a:endParaRPr lang="en-CA"/>
           </a:p>
@@ -6323,7 +6323,7 @@
           <a:p>
             <a:fld id="{8C1E5588-8BC4-4B22-ADAE-E90DB866E4BB}" type="datetimeFigureOut">
               <a:rPr lang="en-CA" smtClean="0"/>
-              <a:t>30/11/2016</a:t>
+              <a:t>01/12/2016</a:t>
             </a:fld>
             <a:endParaRPr lang="en-CA"/>
           </a:p>
@@ -6713,7 +6713,7 @@
           <a:p>
             <a:fld id="{8C1E5588-8BC4-4B22-ADAE-E90DB866E4BB}" type="datetimeFigureOut">
               <a:rPr lang="en-CA" smtClean="0"/>
-              <a:t>30/11/2016</a:t>
+              <a:t>01/12/2016</a:t>
             </a:fld>
             <a:endParaRPr lang="en-CA"/>
           </a:p>
@@ -7122,7 +7122,7 @@
           <a:p>
             <a:fld id="{8C1E5588-8BC4-4B22-ADAE-E90DB866E4BB}" type="datetimeFigureOut">
               <a:rPr lang="en-CA" smtClean="0"/>
-              <a:t>30/11/2016</a:t>
+              <a:t>01/12/2016</a:t>
             </a:fld>
             <a:endParaRPr lang="en-CA"/>
           </a:p>
@@ -7366,7 +7366,7 @@
           <a:p>
             <a:fld id="{8C1E5588-8BC4-4B22-ADAE-E90DB866E4BB}" type="datetimeFigureOut">
               <a:rPr lang="en-CA" smtClean="0"/>
-              <a:t>30/11/2016</a:t>
+              <a:t>01/12/2016</a:t>
             </a:fld>
             <a:endParaRPr lang="en-CA"/>
           </a:p>
@@ -8065,6 +8065,13 @@
   <p:clrMapOvr>
     <a:masterClrMapping/>
   </p:clrMapOvr>
+  <p:timing>
+    <p:tnLst>
+      <p:par>
+        <p:cTn id="1" dur="indefinite" restart="never" nodeType="tmRoot"/>
+      </p:par>
+    </p:tnLst>
+  </p:timing>
 </p:sld>
 </file>
 
@@ -8245,15 +8252,7 @@
                   <a:srgbClr val="000000"/>
                 </a:solidFill>
               </a:rPr>
-              <a:t>Tracked </a:t>
-            </a:r>
-            <a:r>
-              <a:rPr lang="en-CA" dirty="0" smtClean="0">
-                <a:solidFill>
-                  <a:srgbClr val="000000"/>
-                </a:solidFill>
-              </a:rPr>
-              <a:t>ultrasound</a:t>
+              <a:t>Tracked ultrasound</a:t>
             </a:r>
           </a:p>
           <a:p>
@@ -8265,11 +8264,6 @@
               </a:rPr>
               <a:t>Motivation</a:t>
             </a:r>
-            <a:endParaRPr lang="en-CA" dirty="0" smtClean="0">
-              <a:solidFill>
-                <a:srgbClr val="000000"/>
-              </a:solidFill>
-            </a:endParaRPr>
           </a:p>
           <a:p>
             <a:r>
@@ -8589,33 +8583,15 @@
                                   </p:childTnLst>
                                 </p:cTn>
                               </p:par>
-                            </p:childTnLst>
-                          </p:cTn>
-                        </p:par>
-                      </p:childTnLst>
-                    </p:cTn>
-                  </p:par>
-                  <p:par>
-                    <p:cTn id="8" fill="hold">
-                      <p:stCondLst>
-                        <p:cond delay="indefinite"/>
-                      </p:stCondLst>
-                      <p:childTnLst>
-                        <p:par>
-                          <p:cTn id="9" fill="hold">
-                            <p:stCondLst>
-                              <p:cond delay="0"/>
-                            </p:stCondLst>
-                            <p:childTnLst>
                               <p:par>
-                                <p:cTn id="10" presetID="10" presetClass="entr" presetSubtype="0" fill="hold" nodeType="clickEffect">
+                                <p:cTn id="8" presetID="10" presetClass="entr" presetSubtype="0" fill="hold" nodeType="withEffect">
                                   <p:stCondLst>
                                     <p:cond delay="0"/>
                                   </p:stCondLst>
                                   <p:childTnLst>
                                     <p:set>
                                       <p:cBhvr>
-                                        <p:cTn id="11" dur="1" fill="hold">
+                                        <p:cTn id="9" dur="1" fill="hold">
                                           <p:stCondLst>
                                             <p:cond delay="0"/>
                                           </p:stCondLst>
@@ -8633,7 +8609,7 @@
                                     </p:set>
                                     <p:animEffect transition="in" filter="fade">
                                       <p:cBhvr>
-                                        <p:cTn id="12" dur="1000"/>
+                                        <p:cTn id="10" dur="1000"/>
                                         <p:tgtEl>
                                           <p:spTgt spid="4"/>
                                         </p:tgtEl>
@@ -8649,26 +8625,26 @@
                     </p:cTn>
                   </p:par>
                   <p:par>
-                    <p:cTn id="13" fill="hold">
+                    <p:cTn id="11" fill="hold">
                       <p:stCondLst>
                         <p:cond delay="indefinite"/>
                       </p:stCondLst>
                       <p:childTnLst>
                         <p:par>
-                          <p:cTn id="14" fill="hold">
+                          <p:cTn id="12" fill="hold">
                             <p:stCondLst>
                               <p:cond delay="0"/>
                             </p:stCondLst>
                             <p:childTnLst>
                               <p:par>
-                                <p:cTn id="15" presetID="10" presetClass="entr" presetSubtype="0" fill="hold" nodeType="clickEffect">
+                                <p:cTn id="13" presetID="10" presetClass="entr" presetSubtype="0" fill="hold" nodeType="clickEffect">
                                   <p:stCondLst>
                                     <p:cond delay="0"/>
                                   </p:stCondLst>
                                   <p:childTnLst>
                                     <p:set>
                                       <p:cBhvr>
-                                        <p:cTn id="16" dur="1" fill="hold">
+                                        <p:cTn id="14" dur="1" fill="hold">
                                           <p:stCondLst>
                                             <p:cond delay="0"/>
                                           </p:stCondLst>
@@ -8690,7 +8666,7 @@
                                     </p:set>
                                     <p:animEffect transition="in" filter="fade">
                                       <p:cBhvr>
-                                        <p:cTn id="17" dur="1000"/>
+                                        <p:cTn id="15" dur="1000"/>
                                         <p:tgtEl>
                                           <p:spTgt spid="3">
                                             <p:txEl>
@@ -8710,26 +8686,26 @@
                     </p:cTn>
                   </p:par>
                   <p:par>
-                    <p:cTn id="18" fill="hold">
+                    <p:cTn id="16" fill="hold">
                       <p:stCondLst>
                         <p:cond delay="indefinite"/>
                       </p:stCondLst>
                       <p:childTnLst>
                         <p:par>
-                          <p:cTn id="19" fill="hold">
+                          <p:cTn id="17" fill="hold">
                             <p:stCondLst>
                               <p:cond delay="0"/>
                             </p:stCondLst>
                             <p:childTnLst>
                               <p:par>
-                                <p:cTn id="20" presetID="10" presetClass="entr" presetSubtype="0" fill="hold" nodeType="clickEffect">
+                                <p:cTn id="18" presetID="10" presetClass="entr" presetSubtype="0" fill="hold" nodeType="clickEffect">
                                   <p:stCondLst>
                                     <p:cond delay="0"/>
                                   </p:stCondLst>
                                   <p:childTnLst>
                                     <p:set>
                                       <p:cBhvr>
-                                        <p:cTn id="21" dur="1" fill="hold">
+                                        <p:cTn id="19" dur="1" fill="hold">
                                           <p:stCondLst>
                                             <p:cond delay="0"/>
                                           </p:stCondLst>
@@ -8751,7 +8727,7 @@
                                     </p:set>
                                     <p:animEffect transition="in" filter="fade">
                                       <p:cBhvr>
-                                        <p:cTn id="22" dur="1000"/>
+                                        <p:cTn id="20" dur="1000"/>
                                         <p:tgtEl>
                                           <p:spTgt spid="3">
                                             <p:txEl>
@@ -9221,33 +9197,15 @@
                                   </p:childTnLst>
                                 </p:cTn>
                               </p:par>
-                            </p:childTnLst>
-                          </p:cTn>
-                        </p:par>
-                      </p:childTnLst>
-                    </p:cTn>
-                  </p:par>
-                  <p:par>
-                    <p:cTn id="8" fill="hold">
-                      <p:stCondLst>
-                        <p:cond delay="indefinite"/>
-                      </p:stCondLst>
-                      <p:childTnLst>
-                        <p:par>
-                          <p:cTn id="9" fill="hold">
-                            <p:stCondLst>
-                              <p:cond delay="0"/>
-                            </p:stCondLst>
-                            <p:childTnLst>
                               <p:par>
-                                <p:cTn id="10" presetID="10" presetClass="entr" presetSubtype="0" fill="hold" nodeType="clickEffect">
+                                <p:cTn id="8" presetID="10" presetClass="entr" presetSubtype="0" fill="hold" nodeType="withEffect">
                                   <p:stCondLst>
                                     <p:cond delay="0"/>
                                   </p:stCondLst>
                                   <p:childTnLst>
                                     <p:set>
                                       <p:cBhvr>
-                                        <p:cTn id="11" dur="1" fill="hold">
+                                        <p:cTn id="9" dur="1" fill="hold">
                                           <p:stCondLst>
                                             <p:cond delay="0"/>
                                           </p:stCondLst>
@@ -9265,7 +9223,7 @@
                                     </p:set>
                                     <p:animEffect transition="in" filter="fade">
                                       <p:cBhvr>
-                                        <p:cTn id="12" dur="1000"/>
+                                        <p:cTn id="10" dur="1000"/>
                                         <p:tgtEl>
                                           <p:spTgt spid="6"/>
                                         </p:tgtEl>
@@ -9281,26 +9239,26 @@
                     </p:cTn>
                   </p:par>
                   <p:par>
-                    <p:cTn id="13" fill="hold">
+                    <p:cTn id="11" fill="hold">
                       <p:stCondLst>
                         <p:cond delay="indefinite"/>
                       </p:stCondLst>
                       <p:childTnLst>
                         <p:par>
-                          <p:cTn id="14" fill="hold">
+                          <p:cTn id="12" fill="hold">
                             <p:stCondLst>
                               <p:cond delay="0"/>
                             </p:stCondLst>
                             <p:childTnLst>
                               <p:par>
-                                <p:cTn id="15" presetID="10" presetClass="entr" presetSubtype="0" fill="hold" nodeType="clickEffect">
+                                <p:cTn id="13" presetID="10" presetClass="entr" presetSubtype="0" fill="hold" nodeType="clickEffect">
                                   <p:stCondLst>
                                     <p:cond delay="0"/>
                                   </p:stCondLst>
                                   <p:childTnLst>
                                     <p:set>
                                       <p:cBhvr>
-                                        <p:cTn id="16" dur="1" fill="hold">
+                                        <p:cTn id="14" dur="1" fill="hold">
                                           <p:stCondLst>
                                             <p:cond delay="0"/>
                                           </p:stCondLst>
@@ -9322,7 +9280,7 @@
                                     </p:set>
                                     <p:animEffect transition="in" filter="fade">
                                       <p:cBhvr>
-                                        <p:cTn id="17" dur="1000"/>
+                                        <p:cTn id="15" dur="1000"/>
                                         <p:tgtEl>
                                           <p:spTgt spid="3">
                                             <p:txEl>
@@ -9342,26 +9300,26 @@
                     </p:cTn>
                   </p:par>
                   <p:par>
-                    <p:cTn id="18" fill="hold">
+                    <p:cTn id="16" fill="hold">
                       <p:stCondLst>
                         <p:cond delay="indefinite"/>
                       </p:stCondLst>
                       <p:childTnLst>
                         <p:par>
-                          <p:cTn id="19" fill="hold">
+                          <p:cTn id="17" fill="hold">
                             <p:stCondLst>
                               <p:cond delay="0"/>
                             </p:stCondLst>
                             <p:childTnLst>
                               <p:par>
-                                <p:cTn id="20" presetID="22" presetClass="entr" presetSubtype="2" fill="hold" nodeType="clickEffect">
+                                <p:cTn id="18" presetID="22" presetClass="entr" presetSubtype="2" fill="hold" nodeType="clickEffect">
                                   <p:stCondLst>
                                     <p:cond delay="0"/>
                                   </p:stCondLst>
                                   <p:childTnLst>
                                     <p:set>
                                       <p:cBhvr>
-                                        <p:cTn id="21" dur="1" fill="hold">
+                                        <p:cTn id="19" dur="1" fill="hold">
                                           <p:stCondLst>
                                             <p:cond delay="0"/>
                                           </p:stCondLst>
@@ -9379,7 +9337,7 @@
                                     </p:set>
                                     <p:animEffect transition="in" filter="wipe(right)">
                                       <p:cBhvr>
-                                        <p:cTn id="22" dur="1000"/>
+                                        <p:cTn id="20" dur="1000"/>
                                         <p:tgtEl>
                                           <p:spTgt spid="8"/>
                                         </p:tgtEl>
@@ -9389,14 +9347,14 @@
                                 </p:cTn>
                               </p:par>
                               <p:par>
-                                <p:cTn id="23" presetID="22" presetClass="entr" presetSubtype="2" fill="hold" nodeType="withEffect">
+                                <p:cTn id="21" presetID="22" presetClass="entr" presetSubtype="2" fill="hold" nodeType="withEffect">
                                   <p:stCondLst>
                                     <p:cond delay="500"/>
                                   </p:stCondLst>
                                   <p:childTnLst>
                                     <p:set>
                                       <p:cBhvr>
-                                        <p:cTn id="24" dur="1" fill="hold">
+                                        <p:cTn id="22" dur="1" fill="hold">
                                           <p:stCondLst>
                                             <p:cond delay="0"/>
                                           </p:stCondLst>
@@ -9414,7 +9372,7 @@
                                     </p:set>
                                     <p:animEffect transition="in" filter="wipe(right)">
                                       <p:cBhvr>
-                                        <p:cTn id="25" dur="1000"/>
+                                        <p:cTn id="23" dur="1000"/>
                                         <p:tgtEl>
                                           <p:spTgt spid="10"/>
                                         </p:tgtEl>
@@ -9424,14 +9382,14 @@
                                 </p:cTn>
                               </p:par>
                               <p:par>
-                                <p:cTn id="26" presetID="22" presetClass="entr" presetSubtype="4" fill="hold" grpId="0" nodeType="withEffect">
+                                <p:cTn id="24" presetID="22" presetClass="entr" presetSubtype="4" fill="hold" grpId="0" nodeType="withEffect">
                                   <p:stCondLst>
                                     <p:cond delay="1000"/>
                                   </p:stCondLst>
                                   <p:childTnLst>
                                     <p:set>
                                       <p:cBhvr>
-                                        <p:cTn id="27" dur="1" fill="hold">
+                                        <p:cTn id="25" dur="1" fill="hold">
                                           <p:stCondLst>
                                             <p:cond delay="0"/>
                                           </p:stCondLst>
@@ -9449,7 +9407,7 @@
                                     </p:set>
                                     <p:animEffect transition="in" filter="wipe(down)">
                                       <p:cBhvr>
-                                        <p:cTn id="28" dur="1000"/>
+                                        <p:cTn id="26" dur="1000"/>
                                         <p:tgtEl>
                                           <p:spTgt spid="11"/>
                                         </p:tgtEl>
@@ -9782,65 +9740,6 @@
           </a:sp3d>
         </p:spPr>
       </p:pic>
-      <p:pic>
-        <p:nvPicPr>
-          <p:cNvPr id="7" name="Picture 6"/>
-          <p:cNvPicPr>
-            <a:picLocks noChangeAspect="1"/>
-          </p:cNvPicPr>
-          <p:nvPr/>
-        </p:nvPicPr>
-        <p:blipFill rotWithShape="1">
-          <a:blip r:embed="rId5">
-            <a:extLst>
-              <a:ext uri="{28A0092B-C50C-407E-A947-70E740481C1C}">
-                <a14:useLocalDpi xmlns:a14="http://schemas.microsoft.com/office/drawing/2010/main" val="0"/>
-              </a:ext>
-            </a:extLst>
-          </a:blip>
-          <a:srcRect l="28090" t="991" r="28711" b="2240"/>
-          <a:stretch/>
-        </p:blipFill>
-        <p:spPr>
-          <a:xfrm>
-            <a:off x="7369629" y="1687286"/>
-            <a:ext cx="2536371" cy="4702628"/>
-          </a:xfrm>
-          <a:prstGeom prst="rect">
-            <a:avLst/>
-          </a:prstGeom>
-          <a:solidFill>
-            <a:srgbClr val="FFFFFF">
-              <a:shade val="85000"/>
-            </a:srgbClr>
-          </a:solidFill>
-          <a:ln w="76200" cap="sq">
-            <a:solidFill>
-              <a:srgbClr val="FFFFFF"/>
-            </a:solidFill>
-            <a:miter lim="800000"/>
-          </a:ln>
-          <a:effectLst>
-            <a:outerShdw blurRad="55000" dist="18000" dir="5400000" algn="tl" rotWithShape="0">
-              <a:srgbClr val="000000">
-                <a:alpha val="40000"/>
-              </a:srgbClr>
-            </a:outerShdw>
-          </a:effectLst>
-          <a:scene3d>
-            <a:camera prst="orthographicFront"/>
-            <a:lightRig rig="twoPt" dir="t">
-              <a:rot lat="0" lon="0" rev="7200000"/>
-            </a:lightRig>
-          </a:scene3d>
-          <a:sp3d>
-            <a:bevelT w="25400" h="19050"/>
-            <a:contourClr>
-              <a:srgbClr val="FFFFFF"/>
-            </a:contourClr>
-          </a:sp3d>
-        </p:spPr>
-      </p:pic>
       <p:cxnSp>
         <p:nvCxnSpPr>
           <p:cNvPr id="10" name="Straight Connector 9"/>
@@ -9990,14 +9889,57 @@
                             </p:stCondLst>
                             <p:childTnLst>
                               <p:par>
-                                <p:cTn id="5" presetID="10" presetClass="exit" presetSubtype="0" fill="hold" nodeType="clickEffect">
+                                <p:cTn id="5" presetID="10" presetClass="entr" presetSubtype="0" fill="hold" nodeType="clickEffect">
+                                  <p:stCondLst>
+                                    <p:cond delay="0"/>
+                                  </p:stCondLst>
+                                  <p:childTnLst>
+                                    <p:set>
+                                      <p:cBhvr>
+                                        <p:cTn id="6" dur="1" fill="hold">
+                                          <p:stCondLst>
+                                            <p:cond delay="0"/>
+                                          </p:stCondLst>
+                                        </p:cTn>
+                                        <p:tgtEl>
+                                          <p:spTgt spid="3">
+                                            <p:txEl>
+                                              <p:pRg st="0" end="0"/>
+                                            </p:txEl>
+                                          </p:spTgt>
+                                        </p:tgtEl>
+                                        <p:attrNameLst>
+                                          <p:attrName>style.visibility</p:attrName>
+                                        </p:attrNameLst>
+                                      </p:cBhvr>
+                                      <p:to>
+                                        <p:strVal val="visible"/>
+                                      </p:to>
+                                    </p:set>
+                                    <p:animEffect transition="in" filter="fade">
+                                      <p:cBhvr>
+                                        <p:cTn id="7" dur="1000"/>
+                                        <p:tgtEl>
+                                          <p:spTgt spid="3">
+                                            <p:txEl>
+                                              <p:pRg st="0" end="0"/>
+                                            </p:txEl>
+                                          </p:spTgt>
+                                        </p:tgtEl>
+                                      </p:cBhvr>
+                                    </p:animEffect>
+                                  </p:childTnLst>
+                                </p:cTn>
+                              </p:par>
+                              <p:par>
+                                <p:cTn id="8" presetID="10" presetClass="exit" presetSubtype="0" fill="hold" nodeType="withEffect">
                                   <p:stCondLst>
                                     <p:cond delay="0"/>
                                   </p:stCondLst>
                                   <p:childTnLst>
                                     <p:animEffect transition="out" filter="fade">
                                       <p:cBhvr>
-                                        <p:cTn id="6" dur="1000"/>
+                                        <p:cTn id="9" dur="1000"/>
                                         <p:tgtEl>
                                           <p:spTgt spid="5"/>
                                         </p:tgtEl>
@@ -10005,7 +9947,7 @@
                                     </p:animEffect>
                                     <p:set>
                                       <p:cBhvr>
-                                        <p:cTn id="7" dur="1" fill="hold">
+                                        <p:cTn id="10" dur="1" fill="hold">
                                           <p:stCondLst>
                                             <p:cond delay="999"/>
                                           </p:stCondLst>
@@ -10031,32 +9973,36 @@
                     </p:cTn>
                   </p:par>
                   <p:par>
-                    <p:cTn id="8" fill="hold">
+                    <p:cTn id="11" fill="hold">
                       <p:stCondLst>
                         <p:cond delay="indefinite"/>
                       </p:stCondLst>
                       <p:childTnLst>
                         <p:par>
-                          <p:cTn id="9" fill="hold">
+                          <p:cTn id="12" fill="hold">
                             <p:stCondLst>
                               <p:cond delay="0"/>
                             </p:stCondLst>
                             <p:childTnLst>
                               <p:par>
-                                <p:cTn id="10" presetID="10" presetClass="entr" presetSubtype="0" fill="hold" nodeType="clickEffect">
+                                <p:cTn id="13" presetID="10" presetClass="entr" presetSubtype="0" fill="hold" nodeType="clickEffect">
                                   <p:stCondLst>
                                     <p:cond delay="0"/>
                                   </p:stCondLst>
                                   <p:childTnLst>
                                     <p:set>
                                       <p:cBhvr>
-                                        <p:cTn id="11" dur="1" fill="hold">
+                                        <p:cTn id="14" dur="1" fill="hold">
                                           <p:stCondLst>
                                             <p:cond delay="0"/>
                                           </p:stCondLst>
                                         </p:cTn>
                                         <p:tgtEl>
-                                          <p:spTgt spid="7"/>
+                                          <p:spTgt spid="3">
+                                            <p:txEl>
+                                              <p:pRg st="1" end="1"/>
+                                            </p:txEl>
+                                          </p:spTgt>
                                         </p:tgtEl>
                                         <p:attrNameLst>
                                           <p:attrName>style.visibility</p:attrName>
@@ -10068,42 +10014,28 @@
                                     </p:set>
                                     <p:animEffect transition="in" filter="fade">
                                       <p:cBhvr>
-                                        <p:cTn id="12" dur="1000"/>
+                                        <p:cTn id="15" dur="1000"/>
                                         <p:tgtEl>
-                                          <p:spTgt spid="7"/>
+                                          <p:spTgt spid="3">
+                                            <p:txEl>
+                                              <p:pRg st="1" end="1"/>
+                                            </p:txEl>
+                                          </p:spTgt>
                                         </p:tgtEl>
                                       </p:cBhvr>
                                     </p:animEffect>
                                   </p:childTnLst>
                                 </p:cTn>
                               </p:par>
-                            </p:childTnLst>
-                          </p:cTn>
-                        </p:par>
-                      </p:childTnLst>
-                    </p:cTn>
-                  </p:par>
-                  <p:par>
-                    <p:cTn id="13" fill="hold">
-                      <p:stCondLst>
-                        <p:cond delay="indefinite"/>
-                      </p:stCondLst>
-                      <p:childTnLst>
-                        <p:par>
-                          <p:cTn id="14" fill="hold">
-                            <p:stCondLst>
-                              <p:cond delay="0"/>
-                            </p:stCondLst>
-                            <p:childTnLst>
                               <p:par>
-                                <p:cTn id="15" presetID="10" presetClass="exit" presetSubtype="0" fill="hold" nodeType="clickEffect">
+                                <p:cTn id="16" presetID="10" presetClass="exit" presetSubtype="0" fill="hold" nodeType="withEffect">
                                   <p:stCondLst>
                                     <p:cond delay="0"/>
                                   </p:stCondLst>
                                   <p:childTnLst>
                                     <p:animEffect transition="out" filter="fade">
                                       <p:cBhvr>
-                                        <p:cTn id="16" dur="1000"/>
+                                        <p:cTn id="17" dur="1000"/>
                                         <p:tgtEl>
                                           <p:spTgt spid="4"/>
                                         </p:tgtEl>
@@ -10111,7 +10043,7 @@
                                     </p:animEffect>
                                     <p:set>
                                       <p:cBhvr>
-                                        <p:cTn id="17" dur="1" fill="hold">
+                                        <p:cTn id="18" dur="1" fill="hold">
                                           <p:stCondLst>
                                             <p:cond delay="999"/>
                                           </p:stCondLst>
@@ -10137,79 +10069,69 @@
                     </p:cTn>
                   </p:par>
                   <p:par>
-                    <p:cTn id="18" fill="hold">
+                    <p:cTn id="19" fill="hold">
                       <p:stCondLst>
                         <p:cond delay="indefinite"/>
                       </p:stCondLst>
                       <p:childTnLst>
                         <p:par>
-                          <p:cTn id="19" fill="hold">
+                          <p:cTn id="20" fill="hold">
                             <p:stCondLst>
                               <p:cond delay="0"/>
                             </p:stCondLst>
                             <p:childTnLst>
                               <p:par>
-                                <p:cTn id="20" presetID="10" presetClass="exit" presetSubtype="0" fill="hold" nodeType="clickEffect">
+                                <p:cTn id="21" presetID="10" presetClass="entr" presetSubtype="0" fill="hold" nodeType="clickEffect">
                                   <p:stCondLst>
                                     <p:cond delay="0"/>
                                   </p:stCondLst>
                                   <p:childTnLst>
-                                    <p:animEffect transition="out" filter="fade">
-                                      <p:cBhvr>
-                                        <p:cTn id="21" dur="1000"/>
-                                        <p:tgtEl>
-                                          <p:spTgt spid="7"/>
-                                        </p:tgtEl>
-                                      </p:cBhvr>
-                                    </p:animEffect>
                                     <p:set>
                                       <p:cBhvr>
                                         <p:cTn id="22" dur="1" fill="hold">
                                           <p:stCondLst>
-                                            <p:cond delay="999"/>
+                                            <p:cond delay="0"/>
                                           </p:stCondLst>
                                         </p:cTn>
                                         <p:tgtEl>
-                                          <p:spTgt spid="7"/>
+                                          <p:spTgt spid="3">
+                                            <p:txEl>
+                                              <p:pRg st="2" end="2"/>
+                                            </p:txEl>
+                                          </p:spTgt>
                                         </p:tgtEl>
                                         <p:attrNameLst>
                                           <p:attrName>style.visibility</p:attrName>
                                         </p:attrNameLst>
                                       </p:cBhvr>
                                       <p:to>
-                                        <p:strVal val="hidden"/>
+                                        <p:strVal val="visible"/>
                                       </p:to>
                                     </p:set>
+                                    <p:animEffect transition="in" filter="fade">
+                                      <p:cBhvr>
+                                        <p:cTn id="23" dur="1000"/>
+                                        <p:tgtEl>
+                                          <p:spTgt spid="3">
+                                            <p:txEl>
+                                              <p:pRg st="2" end="2"/>
+                                            </p:txEl>
+                                          </p:spTgt>
+                                        </p:tgtEl>
+                                      </p:cBhvr>
+                                    </p:animEffect>
                                   </p:childTnLst>
                                 </p:cTn>
                               </p:par>
-                            </p:childTnLst>
-                          </p:cTn>
-                        </p:par>
-                      </p:childTnLst>
-                    </p:cTn>
-                  </p:par>
-                  <p:par>
-                    <p:cTn id="23" fill="hold">
-                      <p:stCondLst>
-                        <p:cond delay="indefinite"/>
-                      </p:stCondLst>
-                      <p:childTnLst>
-                        <p:par>
-                          <p:cTn id="24" fill="hold">
-                            <p:stCondLst>
-                              <p:cond delay="0"/>
-                            </p:stCondLst>
-                            <p:childTnLst>
                               <p:par>
-                                <p:cTn id="25" presetID="22" presetClass="entr" presetSubtype="2" fill="hold" nodeType="clickEffect">
+                                <p:cTn id="24" presetID="22" presetClass="entr" presetSubtype="2" fill="hold" nodeType="withEffect">
                                   <p:stCondLst>
                                     <p:cond delay="0"/>
                                   </p:stCondLst>
                                   <p:childTnLst>
                                     <p:set>
                                       <p:cBhvr>
-                                        <p:cTn id="26" dur="1" fill="hold">
+                                        <p:cTn id="25" dur="1" fill="hold">
                                           <p:stCondLst>
                                             <p:cond delay="0"/>
                                           </p:stCondLst>
@@ -10227,7 +10149,7 @@
                                     </p:set>
                                     <p:animEffect transition="in" filter="wipe(right)">
                                       <p:cBhvr>
-                                        <p:cTn id="27" dur="1000"/>
+                                        <p:cTn id="26" dur="1000"/>
                                         <p:tgtEl>
                                           <p:spTgt spid="10"/>
                                         </p:tgtEl>
@@ -10237,14 +10159,14 @@
                                 </p:cTn>
                               </p:par>
                               <p:par>
-                                <p:cTn id="28" presetID="22" presetClass="entr" presetSubtype="2" fill="hold" nodeType="withEffect">
+                                <p:cTn id="27" presetID="22" presetClass="entr" presetSubtype="2" fill="hold" nodeType="withEffect">
                                   <p:stCondLst>
-                                    <p:cond delay="500"/>
+                                    <p:cond delay="0"/>
                                   </p:stCondLst>
                                   <p:childTnLst>
                                     <p:set>
                                       <p:cBhvr>
-                                        <p:cTn id="29" dur="1" fill="hold">
+                                        <p:cTn id="28" dur="1" fill="hold">
                                           <p:stCondLst>
                                             <p:cond delay="0"/>
                                           </p:stCondLst>
@@ -10262,7 +10184,7 @@
                                     </p:set>
                                     <p:animEffect transition="in" filter="wipe(right)">
                                       <p:cBhvr>
-                                        <p:cTn id="30" dur="1000"/>
+                                        <p:cTn id="29" dur="1000"/>
                                         <p:tgtEl>
                                           <p:spTgt spid="12"/>
                                         </p:tgtEl>
@@ -10272,14 +10194,14 @@
                                 </p:cTn>
                               </p:par>
                               <p:par>
-                                <p:cTn id="31" presetID="22" presetClass="entr" presetSubtype="4" fill="hold" grpId="0" nodeType="withEffect">
+                                <p:cTn id="30" presetID="22" presetClass="entr" presetSubtype="4" fill="hold" grpId="0" nodeType="withEffect">
                                   <p:stCondLst>
-                                    <p:cond delay="1000"/>
+                                    <p:cond delay="0"/>
                                   </p:stCondLst>
                                   <p:childTnLst>
                                     <p:set>
                                       <p:cBhvr>
-                                        <p:cTn id="32" dur="1" fill="hold">
+                                        <p:cTn id="31" dur="1" fill="hold">
                                           <p:stCondLst>
                                             <p:cond delay="0"/>
                                           </p:stCondLst>
@@ -10297,7 +10219,7 @@
                                     </p:set>
                                     <p:animEffect transition="in" filter="wipe(down)">
                                       <p:cBhvr>
-                                        <p:cTn id="33" dur="1000"/>
+                                        <p:cTn id="32" dur="1000"/>
                                         <p:tgtEl>
                                           <p:spTgt spid="13"/>
                                         </p:tgtEl>
@@ -10454,12 +10376,12 @@
         <p:spPr>
           <a:xfrm>
             <a:off x="680321" y="2336873"/>
-            <a:ext cx="4832205" cy="3599316"/>
+            <a:ext cx="5110879" cy="3599316"/>
           </a:xfrm>
         </p:spPr>
         <p:txBody>
           <a:bodyPr>
-            <a:normAutofit/>
+            <a:normAutofit lnSpcReduction="10000"/>
           </a:bodyPr>
           <a:lstStyle/>
           <a:p>
@@ -10514,7 +10436,44 @@
                   </a:schemeClr>
                 </a:solidFill>
               </a:rPr>
-              <a:t>Random noise</a:t>
+              <a:t>Random </a:t>
+            </a:r>
+            <a:r>
+              <a:rPr lang="en-CA" sz="2800" dirty="0" smtClean="0">
+                <a:solidFill>
+                  <a:schemeClr val="bg1">
+                    <a:lumMod val="95000"/>
+                    <a:lumOff val="5000"/>
+                  </a:schemeClr>
+                </a:solidFill>
+              </a:rPr>
+              <a:t>noise</a:t>
+            </a:r>
+          </a:p>
+          <a:p>
+            <a:endParaRPr lang="en-CA" sz="2800" dirty="0">
+              <a:solidFill>
+                <a:schemeClr val="bg1">
+                  <a:lumMod val="95000"/>
+                  <a:lumOff val="5000"/>
+                </a:schemeClr>
+              </a:solidFill>
+            </a:endParaRPr>
+          </a:p>
+          <a:p>
+            <a:pPr marL="0" indent="0">
+              <a:buNone/>
+            </a:pPr>
+            <a:r>
+              <a:rPr lang="en-CA" sz="3600" dirty="0" smtClean="0">
+                <a:solidFill>
+                  <a:schemeClr val="bg1">
+                    <a:lumMod val="95000"/>
+                    <a:lumOff val="5000"/>
+                  </a:schemeClr>
+                </a:solidFill>
+              </a:rPr>
+              <a:t>Can curvature be retrieved?</a:t>
             </a:r>
             <a:endParaRPr lang="en-CA" sz="2800" dirty="0" smtClean="0">
               <a:solidFill>
@@ -11020,6 +10979,67 @@
                       </p:childTnLst>
                     </p:cTn>
                   </p:par>
+                  <p:par>
+                    <p:cTn id="27" fill="hold">
+                      <p:stCondLst>
+                        <p:cond delay="indefinite"/>
+                      </p:stCondLst>
+                      <p:childTnLst>
+                        <p:par>
+                          <p:cTn id="28" fill="hold">
+                            <p:stCondLst>
+                              <p:cond delay="0"/>
+                            </p:stCondLst>
+                            <p:childTnLst>
+                              <p:par>
+                                <p:cTn id="29" presetID="10" presetClass="entr" presetSubtype="0" fill="hold" nodeType="clickEffect">
+                                  <p:stCondLst>
+                                    <p:cond delay="0"/>
+                                  </p:stCondLst>
+                                  <p:childTnLst>
+                                    <p:set>
+                                      <p:cBhvr>
+                                        <p:cTn id="30" dur="1" fill="hold">
+                                          <p:stCondLst>
+                                            <p:cond delay="0"/>
+                                          </p:stCondLst>
+                                        </p:cTn>
+                                        <p:tgtEl>
+                                          <p:spTgt spid="3">
+                                            <p:txEl>
+                                              <p:pRg st="5" end="5"/>
+                                            </p:txEl>
+                                          </p:spTgt>
+                                        </p:tgtEl>
+                                        <p:attrNameLst>
+                                          <p:attrName>style.visibility</p:attrName>
+                                        </p:attrNameLst>
+                                      </p:cBhvr>
+                                      <p:to>
+                                        <p:strVal val="visible"/>
+                                      </p:to>
+                                    </p:set>
+                                    <p:animEffect transition="in" filter="fade">
+                                      <p:cBhvr>
+                                        <p:cTn id="31" dur="1000"/>
+                                        <p:tgtEl>
+                                          <p:spTgt spid="3">
+                                            <p:txEl>
+                                              <p:pRg st="5" end="5"/>
+                                            </p:txEl>
+                                          </p:spTgt>
+                                        </p:tgtEl>
+                                      </p:cBhvr>
+                                    </p:animEffect>
+                                  </p:childTnLst>
+                                </p:cTn>
+                              </p:par>
+                            </p:childTnLst>
+                          </p:cTn>
+                        </p:par>
+                      </p:childTnLst>
+                    </p:cTn>
+                  </p:par>
                 </p:childTnLst>
               </p:cTn>
               <p:prevCondLst>
@@ -11616,6 +11636,240 @@
           </a:sp3d>
         </p:spPr>
       </p:pic>
+      <p:sp>
+        <p:nvSpPr>
+          <p:cNvPr id="3" name="Right Arrow 2"/>
+          <p:cNvSpPr/>
+          <p:nvPr/>
+        </p:nvSpPr>
+        <p:spPr>
+          <a:xfrm>
+            <a:off x="3519054" y="2995173"/>
+            <a:ext cx="1191491" cy="914400"/>
+          </a:xfrm>
+          <a:prstGeom prst="rightArrow">
+            <a:avLst/>
+          </a:prstGeom>
+          <a:ln w="38100">
+            <a:solidFill>
+              <a:schemeClr val="bg1"/>
+            </a:solidFill>
+          </a:ln>
+        </p:spPr>
+        <p:style>
+          <a:lnRef idx="2">
+            <a:schemeClr val="accent1">
+              <a:shade val="50000"/>
+            </a:schemeClr>
+          </a:lnRef>
+          <a:fillRef idx="1">
+            <a:schemeClr val="accent1"/>
+          </a:fillRef>
+          <a:effectRef idx="0">
+            <a:schemeClr val="accent1"/>
+          </a:effectRef>
+          <a:fontRef idx="minor">
+            <a:schemeClr val="lt1"/>
+          </a:fontRef>
+        </p:style>
+        <p:txBody>
+          <a:bodyPr rtlCol="0" anchor="ctr"/>
+          <a:lstStyle/>
+          <a:p>
+            <a:pPr algn="ctr"/>
+            <a:endParaRPr lang="en-CA"/>
+          </a:p>
+        </p:txBody>
+      </p:sp>
+      <p:sp>
+        <p:nvSpPr>
+          <p:cNvPr id="4" name="TextBox 3"/>
+          <p:cNvSpPr txBox="1"/>
+          <p:nvPr/>
+        </p:nvSpPr>
+        <p:spPr>
+          <a:xfrm>
+            <a:off x="4801923" y="2927927"/>
+            <a:ext cx="2475346" cy="1200329"/>
+          </a:xfrm>
+          <a:prstGeom prst="rect">
+            <a:avLst/>
+          </a:prstGeom>
+          <a:noFill/>
+          <a:ln w="76200">
+            <a:solidFill>
+              <a:schemeClr val="bg1"/>
+            </a:solidFill>
+          </a:ln>
+        </p:spPr>
+        <p:txBody>
+          <a:bodyPr wrap="square" rtlCol="0">
+            <a:spAutoFit/>
+          </a:bodyPr>
+          <a:lstStyle/>
+          <a:p>
+            <a:pPr algn="ctr"/>
+            <a:r>
+              <a:rPr lang="en-CA" sz="2400" dirty="0" smtClean="0">
+                <a:solidFill>
+                  <a:schemeClr val="bg1"/>
+                </a:solidFill>
+              </a:rPr>
+              <a:t>Feedforward backpropagation network</a:t>
+            </a:r>
+            <a:endParaRPr lang="en-CA" sz="2400" dirty="0">
+              <a:solidFill>
+                <a:schemeClr val="bg1"/>
+              </a:solidFill>
+            </a:endParaRPr>
+          </a:p>
+        </p:txBody>
+      </p:sp>
+      <p:sp>
+        <p:nvSpPr>
+          <p:cNvPr id="5" name="Right Arrow 4"/>
+          <p:cNvSpPr/>
+          <p:nvPr/>
+        </p:nvSpPr>
+        <p:spPr>
+          <a:xfrm>
+            <a:off x="7389092" y="2995173"/>
+            <a:ext cx="1191491" cy="914400"/>
+          </a:xfrm>
+          <a:prstGeom prst="rightArrow">
+            <a:avLst/>
+          </a:prstGeom>
+          <a:ln w="38100">
+            <a:solidFill>
+              <a:schemeClr val="bg1"/>
+            </a:solidFill>
+          </a:ln>
+        </p:spPr>
+        <p:style>
+          <a:lnRef idx="2">
+            <a:schemeClr val="accent1">
+              <a:shade val="50000"/>
+            </a:schemeClr>
+          </a:lnRef>
+          <a:fillRef idx="1">
+            <a:schemeClr val="accent1"/>
+          </a:fillRef>
+          <a:effectRef idx="0">
+            <a:schemeClr val="accent1"/>
+          </a:effectRef>
+          <a:fontRef idx="minor">
+            <a:schemeClr val="lt1"/>
+          </a:fontRef>
+        </p:style>
+        <p:txBody>
+          <a:bodyPr rtlCol="0" anchor="ctr"/>
+          <a:lstStyle/>
+          <a:p>
+            <a:pPr algn="ctr"/>
+            <a:endParaRPr lang="en-CA"/>
+          </a:p>
+        </p:txBody>
+      </p:sp>
+      <p:grpSp>
+        <p:nvGrpSpPr>
+          <p:cNvPr id="8" name="Group 7"/>
+          <p:cNvGrpSpPr/>
+          <p:nvPr/>
+        </p:nvGrpSpPr>
+        <p:grpSpPr>
+          <a:xfrm>
+            <a:off x="8719127" y="2912199"/>
+            <a:ext cx="2105891" cy="1080348"/>
+            <a:chOff x="8719127" y="2912199"/>
+            <a:chExt cx="2105891" cy="1080348"/>
+          </a:xfrm>
+        </p:grpSpPr>
+        <p:sp>
+          <p:nvSpPr>
+            <p:cNvPr id="6" name="Oval 5"/>
+            <p:cNvSpPr/>
+            <p:nvPr/>
+          </p:nvSpPr>
+          <p:spPr>
+            <a:xfrm>
+              <a:off x="8719127" y="2912199"/>
+              <a:ext cx="2105891" cy="1080348"/>
+            </a:xfrm>
+            <a:prstGeom prst="ellipse">
+              <a:avLst/>
+            </a:prstGeom>
+            <a:noFill/>
+            <a:ln w="38100">
+              <a:solidFill>
+                <a:schemeClr val="bg1"/>
+              </a:solidFill>
+            </a:ln>
+          </p:spPr>
+          <p:style>
+            <a:lnRef idx="2">
+              <a:schemeClr val="accent1">
+                <a:shade val="50000"/>
+              </a:schemeClr>
+            </a:lnRef>
+            <a:fillRef idx="1">
+              <a:schemeClr val="accent1"/>
+            </a:fillRef>
+            <a:effectRef idx="0">
+              <a:schemeClr val="accent1"/>
+            </a:effectRef>
+            <a:fontRef idx="minor">
+              <a:schemeClr val="lt1"/>
+            </a:fontRef>
+          </p:style>
+          <p:txBody>
+            <a:bodyPr rtlCol="0" anchor="ctr"/>
+            <a:lstStyle/>
+            <a:p>
+              <a:pPr algn="ctr"/>
+              <a:endParaRPr lang="en-CA" dirty="0"/>
+            </a:p>
+          </p:txBody>
+        </p:sp>
+        <p:sp>
+          <p:nvSpPr>
+            <p:cNvPr id="7" name="TextBox 6"/>
+            <p:cNvSpPr txBox="1"/>
+            <p:nvPr/>
+          </p:nvSpPr>
+          <p:spPr>
+            <a:xfrm>
+              <a:off x="8865920" y="2975319"/>
+              <a:ext cx="1902690" cy="954107"/>
+            </a:xfrm>
+            <a:prstGeom prst="rect">
+              <a:avLst/>
+            </a:prstGeom>
+            <a:noFill/>
+          </p:spPr>
+          <p:txBody>
+            <a:bodyPr wrap="square" rtlCol="0">
+              <a:spAutoFit/>
+            </a:bodyPr>
+            <a:lstStyle/>
+            <a:p>
+              <a:pPr algn="ctr"/>
+              <a:r>
+                <a:rPr lang="en-CA" sz="2800" dirty="0" smtClean="0">
+                  <a:solidFill>
+                    <a:schemeClr val="bg1"/>
+                  </a:solidFill>
+                </a:rPr>
+                <a:t>Curvature estimate</a:t>
+              </a:r>
+              <a:endParaRPr lang="en-CA" sz="2800" dirty="0">
+                <a:solidFill>
+                  <a:schemeClr val="bg1"/>
+                </a:solidFill>
+              </a:endParaRPr>
+            </a:p>
+          </p:txBody>
+        </p:sp>
+      </p:grpSp>
     </p:spTree>
     <p:extLst>
       <p:ext uri="{BB962C8B-B14F-4D97-AF65-F5344CB8AC3E}">
@@ -11638,6 +11892,9 @@
                     <p:cTn id="3" fill="hold">
                       <p:stCondLst>
                         <p:cond delay="indefinite"/>
+                        <p:cond evt="onBegin" delay="0">
+                          <p:tn val="2"/>
+                        </p:cond>
                       </p:stCondLst>
                       <p:childTnLst>
                         <p:par>
@@ -11647,7 +11904,7 @@
                             </p:stCondLst>
                             <p:childTnLst>
                               <p:par>
-                                <p:cTn id="5" presetID="42" presetClass="path" presetSubtype="0" accel="50000" decel="50000" fill="hold" nodeType="clickEffect">
+                                <p:cTn id="5" presetID="42" presetClass="path" presetSubtype="0" accel="50000" decel="50000" fill="hold" nodeType="withEffect">
                                   <p:stCondLst>
                                     <p:cond delay="0"/>
                                   </p:stCondLst>
@@ -11665,6 +11922,155 @@
                                       </p:cBhvr>
                                       <p:rCtr x="-14648" y="69"/>
                                     </p:animMotion>
+                                  </p:childTnLst>
+                                </p:cTn>
+                              </p:par>
+                            </p:childTnLst>
+                          </p:cTn>
+                        </p:par>
+                        <p:par>
+                          <p:cTn id="7" fill="hold">
+                            <p:stCondLst>
+                              <p:cond delay="1500"/>
+                            </p:stCondLst>
+                            <p:childTnLst>
+                              <p:par>
+                                <p:cTn id="8" presetID="10" presetClass="entr" presetSubtype="0" fill="hold" grpId="0" nodeType="afterEffect">
+                                  <p:stCondLst>
+                                    <p:cond delay="0"/>
+                                  </p:stCondLst>
+                                  <p:childTnLst>
+                                    <p:set>
+                                      <p:cBhvr>
+                                        <p:cTn id="9" dur="1" fill="hold">
+                                          <p:stCondLst>
+                                            <p:cond delay="0"/>
+                                          </p:stCondLst>
+                                        </p:cTn>
+                                        <p:tgtEl>
+                                          <p:spTgt spid="3"/>
+                                        </p:tgtEl>
+                                        <p:attrNameLst>
+                                          <p:attrName>style.visibility</p:attrName>
+                                        </p:attrNameLst>
+                                      </p:cBhvr>
+                                      <p:to>
+                                        <p:strVal val="visible"/>
+                                      </p:to>
+                                    </p:set>
+                                    <p:animEffect transition="in" filter="fade">
+                                      <p:cBhvr>
+                                        <p:cTn id="10" dur="1000"/>
+                                        <p:tgtEl>
+                                          <p:spTgt spid="3"/>
+                                        </p:tgtEl>
+                                      </p:cBhvr>
+                                    </p:animEffect>
+                                  </p:childTnLst>
+                                </p:cTn>
+                              </p:par>
+                              <p:par>
+                                <p:cTn id="11" presetID="10" presetClass="entr" presetSubtype="0" fill="hold" grpId="0" nodeType="withEffect">
+                                  <p:stCondLst>
+                                    <p:cond delay="500"/>
+                                  </p:stCondLst>
+                                  <p:childTnLst>
+                                    <p:set>
+                                      <p:cBhvr>
+                                        <p:cTn id="12" dur="1" fill="hold">
+                                          <p:stCondLst>
+                                            <p:cond delay="0"/>
+                                          </p:stCondLst>
+                                        </p:cTn>
+                                        <p:tgtEl>
+                                          <p:spTgt spid="4"/>
+                                        </p:tgtEl>
+                                        <p:attrNameLst>
+                                          <p:attrName>style.visibility</p:attrName>
+                                        </p:attrNameLst>
+                                      </p:cBhvr>
+                                      <p:to>
+                                        <p:strVal val="visible"/>
+                                      </p:to>
+                                    </p:set>
+                                    <p:animEffect transition="in" filter="fade">
+                                      <p:cBhvr>
+                                        <p:cTn id="13" dur="1000"/>
+                                        <p:tgtEl>
+                                          <p:spTgt spid="4"/>
+                                        </p:tgtEl>
+                                      </p:cBhvr>
+                                    </p:animEffect>
+                                  </p:childTnLst>
+                                </p:cTn>
+                              </p:par>
+                              <p:par>
+                                <p:cTn id="14" presetID="10" presetClass="entr" presetSubtype="0" fill="hold" grpId="0" nodeType="withEffect">
+                                  <p:stCondLst>
+                                    <p:cond delay="1000"/>
+                                  </p:stCondLst>
+                                  <p:childTnLst>
+                                    <p:set>
+                                      <p:cBhvr>
+                                        <p:cTn id="15" dur="1" fill="hold">
+                                          <p:stCondLst>
+                                            <p:cond delay="0"/>
+                                          </p:stCondLst>
+                                        </p:cTn>
+                                        <p:tgtEl>
+                                          <p:spTgt spid="5"/>
+                                        </p:tgtEl>
+                                        <p:attrNameLst>
+                                          <p:attrName>style.visibility</p:attrName>
+                                        </p:attrNameLst>
+                                      </p:cBhvr>
+                                      <p:to>
+                                        <p:strVal val="visible"/>
+                                      </p:to>
+                                    </p:set>
+                                    <p:animEffect transition="in" filter="fade">
+                                      <p:cBhvr>
+                                        <p:cTn id="16" dur="1000"/>
+                                        <p:tgtEl>
+                                          <p:spTgt spid="5"/>
+                                        </p:tgtEl>
+                                      </p:cBhvr>
+                                    </p:animEffect>
+                                  </p:childTnLst>
+                                </p:cTn>
+                              </p:par>
+                              <p:par>
+                                <p:cTn id="17" presetID="10" presetClass="entr" presetSubtype="0" fill="hold" nodeType="withEffect">
+                                  <p:stCondLst>
+                                    <p:cond delay="1500"/>
+                                  </p:stCondLst>
+                                  <p:childTnLst>
+                                    <p:set>
+                                      <p:cBhvr>
+                                        <p:cTn id="18" dur="1" fill="hold">
+                                          <p:stCondLst>
+                                            <p:cond delay="0"/>
+                                          </p:stCondLst>
+                                        </p:cTn>
+                                        <p:tgtEl>
+                                          <p:spTgt spid="8"/>
+                                        </p:tgtEl>
+                                        <p:attrNameLst>
+                                          <p:attrName>style.visibility</p:attrName>
+                                        </p:attrNameLst>
+                                      </p:cBhvr>
+                                      <p:to>
+                                        <p:strVal val="visible"/>
+                                      </p:to>
+                                    </p:set>
+                                    <p:animEffect transition="in" filter="fade">
+                                      <p:cBhvr>
+                                        <p:cTn id="19" dur="1000"/>
+                                        <p:tgtEl>
+                                          <p:spTgt spid="8"/>
+                                        </p:tgtEl>
+                                      </p:cBhvr>
+                                    </p:animEffect>
                                   </p:childTnLst>
                                 </p:cTn>
                               </p:par>
@@ -11695,6 +12101,11 @@
         </p:cTn>
       </p:par>
     </p:tnLst>
+    <p:bldLst>
+      <p:bldP spid="3" grpId="0" animBg="1"/>
+      <p:bldP spid="4" grpId="0" animBg="1"/>
+      <p:bldP spid="5" grpId="0" animBg="1"/>
+    </p:bldLst>
   </p:timing>
 </p:sld>
 </file>

</xml_diff>